<commit_message>
added new project wizard, buggy still and create new container
</commit_message>
<xml_diff>
--- a/Main/Guide.pptx
+++ b/Main/Guide.pptx
@@ -5,12 +5,15 @@
     <p:sldMasterId id="2147483660" r:id="rId1"/>
   </p:sldMasterIdLst>
   <p:notesMasterIdLst>
-    <p:notesMasterId r:id="rId5"/>
+    <p:notesMasterId r:id="rId8"/>
   </p:notesMasterIdLst>
   <p:sldIdLst>
     <p:sldId id="256" r:id="rId2"/>
     <p:sldId id="257" r:id="rId3"/>
     <p:sldId id="258" r:id="rId4"/>
+    <p:sldId id="259" r:id="rId5"/>
+    <p:sldId id="261" r:id="rId6"/>
+    <p:sldId id="260" r:id="rId7"/>
   </p:sldIdLst>
   <p:sldSz cx="12192000" cy="6858000"/>
   <p:notesSz cx="6858000" cy="9144000"/>
@@ -121,6 +124,9 @@
         <p14:section name="Untitled Section" id="{7D517D94-3401-4753-8975-098FFA4FA888}">
           <p14:sldIdLst>
             <p14:sldId id="258"/>
+            <p14:sldId id="259"/>
+            <p14:sldId id="261"/>
+            <p14:sldId id="260"/>
           </p14:sldIdLst>
         </p14:section>
       </p14:sectionLst>
@@ -214,7 +220,7 @@
           <a:p>
             <a:fld id="{3611CF13-303D-440F-943E-B3356A10441D}" type="datetimeFigureOut">
               <a:rPr lang="en-DK" smtClean="0"/>
-              <a:t>14/06/2018</a:t>
+              <a:t>19/06/2018</a:t>
             </a:fld>
             <a:endParaRPr lang="en-DK"/>
           </a:p>
@@ -651,7 +657,7 @@
           <a:p>
             <a:fld id="{8A1C8D9D-9C9D-4235-A5A7-283321EF4101}" type="datetime1">
               <a:rPr lang="en-US" smtClean="0"/>
-              <a:t>6/14/2018</a:t>
+              <a:t>6/19/2018</a:t>
             </a:fld>
             <a:endParaRPr lang="en-US"/>
           </a:p>
@@ -981,7 +987,7 @@
           <a:p>
             <a:fld id="{2D422E4B-4577-4A02-A6EC-E2D1EF7F9B60}" type="datetime1">
               <a:rPr lang="en-US" smtClean="0"/>
-              <a:t>6/14/2018</a:t>
+              <a:t>6/19/2018</a:t>
             </a:fld>
             <a:endParaRPr lang="en-US"/>
           </a:p>
@@ -1161,7 +1167,7 @@
           <a:p>
             <a:fld id="{F9F4D710-76D7-4C8B-99F4-EB2753F48968}" type="datetime1">
               <a:rPr lang="en-US" smtClean="0"/>
-              <a:t>6/14/2018</a:t>
+              <a:t>6/19/2018</a:t>
             </a:fld>
             <a:endParaRPr lang="en-US"/>
           </a:p>
@@ -1331,7 +1337,7 @@
           <a:p>
             <a:fld id="{D6EAC811-E058-4F2B-AC96-AB888D217E60}" type="datetime1">
               <a:rPr lang="en-US" smtClean="0"/>
-              <a:t>6/14/2018</a:t>
+              <a:t>6/19/2018</a:t>
             </a:fld>
             <a:endParaRPr lang="en-US"/>
           </a:p>
@@ -1608,7 +1614,7 @@
           <a:p>
             <a:fld id="{59C0C240-8E4D-4595-A4C8-46263B309462}" type="datetime1">
               <a:rPr lang="en-US" smtClean="0"/>
-              <a:t>6/14/2018</a:t>
+              <a:t>6/19/2018</a:t>
             </a:fld>
             <a:endParaRPr lang="en-US"/>
           </a:p>
@@ -2002,7 +2008,7 @@
           <a:p>
             <a:fld id="{D6BCF197-D500-4E47-A7D8-74AA889E9EA7}" type="datetime1">
               <a:rPr lang="en-US" smtClean="0"/>
-              <a:t>6/14/2018</a:t>
+              <a:t>6/19/2018</a:t>
             </a:fld>
             <a:endParaRPr lang="en-US"/>
           </a:p>
@@ -2479,7 +2485,7 @@
           <a:p>
             <a:fld id="{00E1FA4D-ABE3-4779-931E-8B537AE85CC5}" type="datetime1">
               <a:rPr lang="en-US" smtClean="0"/>
-              <a:t>6/14/2018</a:t>
+              <a:t>6/19/2018</a:t>
             </a:fld>
             <a:endParaRPr lang="en-US"/>
           </a:p>
@@ -2597,7 +2603,7 @@
           <a:p>
             <a:fld id="{CE6C3149-CC30-4DED-BA4C-09413572D021}" type="datetime1">
               <a:rPr lang="en-US" smtClean="0"/>
-              <a:t>6/14/2018</a:t>
+              <a:t>6/19/2018</a:t>
             </a:fld>
             <a:endParaRPr lang="en-US"/>
           </a:p>
@@ -2692,7 +2698,7 @@
           <a:p>
             <a:fld id="{23CE8408-ADA6-49FE-9A1B-B0F697D31E14}" type="datetime1">
               <a:rPr lang="en-US" smtClean="0"/>
-              <a:t>6/14/2018</a:t>
+              <a:t>6/19/2018</a:t>
             </a:fld>
             <a:endParaRPr lang="en-US"/>
           </a:p>
@@ -3038,7 +3044,7 @@
           <a:p>
             <a:fld id="{061EFC8C-A7EC-40AE-8893-5D3C30F84FF8}" type="datetime1">
               <a:rPr lang="en-US" smtClean="0"/>
-              <a:t>6/14/2018</a:t>
+              <a:t>6/19/2018</a:t>
             </a:fld>
             <a:endParaRPr lang="en-US"/>
           </a:p>
@@ -3426,7 +3432,7 @@
           <a:p>
             <a:fld id="{99901679-4BC0-453E-8BD2-B5E4353EEFBC}" type="datetime1">
               <a:rPr lang="en-US" smtClean="0"/>
-              <a:t>6/14/2018</a:t>
+              <a:t>6/19/2018</a:t>
             </a:fld>
             <a:endParaRPr lang="en-US"/>
           </a:p>
@@ -3704,7 +3710,7 @@
           <a:p>
             <a:fld id="{020CC676-0883-4A79-B4EA-07871FC52BB8}" type="datetime1">
               <a:rPr lang="en-US" smtClean="0"/>
-              <a:t>6/14/2018</a:t>
+              <a:t>6/19/2018</a:t>
             </a:fld>
             <a:endParaRPr lang="en-US"/>
           </a:p>
@@ -4301,7 +4307,12 @@
             <p:ph type="title"/>
           </p:nvPr>
         </p:nvSpPr>
-        <p:spPr/>
+        <p:spPr>
+          <a:xfrm>
+            <a:off x="1371600" y="685800"/>
+            <a:ext cx="9601200" cy="765313"/>
+          </a:xfrm>
+        </p:spPr>
         <p:txBody>
           <a:bodyPr/>
           <a:lstStyle/>
@@ -4490,7 +4501,7 @@
           <a:p>
             <a:fld id="{22494FE4-82C8-4B3D-9413-621E3C2A6DA2}" type="datetime1">
               <a:rPr lang="en-US" smtClean="0"/>
-              <a:t>6/14/2018</a:t>
+              <a:t>6/19/2018</a:t>
             </a:fld>
             <a:endParaRPr lang="en-US"/>
           </a:p>
@@ -4569,8 +4580,8 @@
         </p:nvSpPr>
         <p:spPr>
           <a:xfrm>
-            <a:off x="1371600" y="346230"/>
-            <a:ext cx="9601200" cy="559292"/>
+            <a:off x="914400" y="346230"/>
+            <a:ext cx="10058400" cy="559292"/>
           </a:xfrm>
         </p:spPr>
         <p:txBody>
@@ -4625,21 +4636,260 @@
           </a:p>
         </p:txBody>
       </p:sp>
+      <p:sp>
+        <p:nvSpPr>
+          <p:cNvPr id="7" name="TextBox 6">
+            <a:extLst>
+              <a:ext uri="{FF2B5EF4-FFF2-40B4-BE49-F238E27FC236}">
+                <a16:creationId xmlns:a16="http://schemas.microsoft.com/office/drawing/2014/main" id="{A290C55D-B2B0-4E09-BF2E-EF361CD1350C}"/>
+              </a:ext>
+            </a:extLst>
+          </p:cNvPr>
+          <p:cNvSpPr txBox="1"/>
+          <p:nvPr/>
+        </p:nvSpPr>
+        <p:spPr>
+          <a:xfrm>
+            <a:off x="838200" y="989044"/>
+            <a:ext cx="10515600" cy="2585323"/>
+          </a:xfrm>
+          <a:prstGeom prst="rect">
+            <a:avLst/>
+          </a:prstGeom>
+          <a:noFill/>
+        </p:spPr>
+        <p:txBody>
+          <a:bodyPr wrap="square" rtlCol="0">
+            <a:spAutoFit/>
+          </a:bodyPr>
+          <a:lstStyle/>
+          <a:p>
+            <a:pPr marL="342900" indent="-342900" algn="just">
+              <a:buAutoNum type="arabicPeriod"/>
+            </a:pPr>
+            <a:r>
+              <a:rPr lang="en-US" dirty="0"/>
+              <a:t>Make sure DexTools.xlam file is saved in a safe run location by adding the save folder path to File/Options/Trust Center/Trust Center Options/Trusted Locations </a:t>
+            </a:r>
+          </a:p>
+          <a:p>
+            <a:pPr marL="342900" indent="-342900" algn="just">
+              <a:buAutoNum type="arabicPeriod"/>
+            </a:pPr>
+            <a:r>
+              <a:rPr lang="en-US" dirty="0"/>
+              <a:t>Enable the trust access to the VBA project object model in File/Options/Trust Center/Trust Center Options/Macro Settings menu</a:t>
+            </a:r>
+          </a:p>
+          <a:p>
+            <a:pPr marL="342900" indent="-342900" algn="just">
+              <a:buAutoNum type="arabicPeriod"/>
+            </a:pPr>
+            <a:r>
+              <a:rPr lang="en-US" dirty="0"/>
+              <a:t>Install JavaScript testing excel library prior to running the macro from </a:t>
+            </a:r>
+            <a:r>
+              <a:rPr lang="en-US" dirty="0">
+                <a:hlinkClick r:id="rId2"/>
+              </a:rPr>
+              <a:t>https://github.com/florentbr/SeleniumBasic/releases/tag/v2.0.9.0</a:t>
+            </a:r>
+            <a:r>
+              <a:rPr lang="en-US" dirty="0"/>
+              <a:t>. This library is used in testing JavaScript functions by executing shell commands against several known web browsers that also need  to be installed on the testing machine. The Java Script testing is still buggy and will be fully enabled at a later stage.</a:t>
+            </a:r>
+          </a:p>
+        </p:txBody>
+      </p:sp>
+    </p:spTree>
+    <p:extLst>
+      <p:ext uri="{BB962C8B-B14F-4D97-AF65-F5344CB8AC3E}">
+        <p14:creationId xmlns:p14="http://schemas.microsoft.com/office/powerpoint/2010/main" val="2892646149"/>
+      </p:ext>
+    </p:extLst>
+  </p:cSld>
+  <p:clrMapOvr>
+    <a:masterClrMapping/>
+  </p:clrMapOvr>
+</p:sld>
+</file>
+
+<file path=ppt/slides/slide4.xml><?xml version="1.0" encoding="utf-8"?>
+<p:sld xmlns:a="http://schemas.openxmlformats.org/drawingml/2006/main" xmlns:r="http://schemas.openxmlformats.org/officeDocument/2006/relationships" xmlns:p="http://schemas.openxmlformats.org/presentationml/2006/main">
+  <p:cSld>
+    <p:spTree>
+      <p:nvGrpSpPr>
+        <p:cNvPr id="1" name=""/>
+        <p:cNvGrpSpPr/>
+        <p:nvPr/>
+      </p:nvGrpSpPr>
+      <p:grpSpPr>
+        <a:xfrm>
+          <a:off x="0" y="0"/>
+          <a:ext cx="0" cy="0"/>
+          <a:chOff x="0" y="0"/>
+          <a:chExt cx="0" cy="0"/>
+        </a:xfrm>
+      </p:grpSpPr>
+      <p:sp>
+        <p:nvSpPr>
+          <p:cNvPr id="10" name="Title 9">
+            <a:extLst>
+              <a:ext uri="{FF2B5EF4-FFF2-40B4-BE49-F238E27FC236}">
+                <a16:creationId xmlns:a16="http://schemas.microsoft.com/office/drawing/2014/main" id="{075C7462-EC0F-4D68-9952-92573D54C26C}"/>
+              </a:ext>
+            </a:extLst>
+          </p:cNvPr>
+          <p:cNvSpPr>
+            <a:spLocks noGrp="1"/>
+          </p:cNvSpPr>
+          <p:nvPr>
+            <p:ph type="title"/>
+          </p:nvPr>
+        </p:nvSpPr>
+        <p:spPr>
+          <a:xfrm>
+            <a:off x="914400" y="346230"/>
+            <a:ext cx="10058400" cy="559292"/>
+          </a:xfrm>
+        </p:spPr>
+        <p:txBody>
+          <a:bodyPr>
+            <a:normAutofit fontScale="90000"/>
+          </a:bodyPr>
+          <a:lstStyle/>
+          <a:p>
+            <a:r>
+              <a:rPr lang="en-US" b="1" dirty="0"/>
+              <a:t>About Section</a:t>
+            </a:r>
+            <a:endParaRPr lang="en-DK" dirty="0"/>
+          </a:p>
+        </p:txBody>
+      </p:sp>
+      <p:sp>
+        <p:nvSpPr>
+          <p:cNvPr id="9" name="Footer Placeholder 8">
+            <a:extLst>
+              <a:ext uri="{FF2B5EF4-FFF2-40B4-BE49-F238E27FC236}">
+                <a16:creationId xmlns:a16="http://schemas.microsoft.com/office/drawing/2014/main" id="{60D1BBA5-12BC-45B2-9AB4-96ED4FFC6E4D}"/>
+              </a:ext>
+            </a:extLst>
+          </p:cNvPr>
+          <p:cNvSpPr>
+            <a:spLocks noGrp="1"/>
+          </p:cNvSpPr>
+          <p:nvPr>
+            <p:ph type="ftr" sz="quarter" idx="11"/>
+          </p:nvPr>
+        </p:nvSpPr>
+        <p:spPr>
+          <a:xfrm>
+            <a:off x="10948725" y="6422313"/>
+            <a:ext cx="962549" cy="404614"/>
+          </a:xfrm>
+        </p:spPr>
+        <p:txBody>
+          <a:bodyPr/>
+          <a:lstStyle/>
+          <a:p>
+            <a:r>
+              <a:rPr lang="en-US" dirty="0"/>
+              <a:t>@</a:t>
+            </a:r>
+            <a:r>
+              <a:rPr lang="en-US" dirty="0" err="1"/>
+              <a:t>DexTools</a:t>
+            </a:r>
+            <a:endParaRPr lang="en-US" dirty="0"/>
+          </a:p>
+        </p:txBody>
+      </p:sp>
+      <p:sp>
+        <p:nvSpPr>
+          <p:cNvPr id="2" name="Rectangle 1">
+            <a:extLst>
+              <a:ext uri="{FF2B5EF4-FFF2-40B4-BE49-F238E27FC236}">
+                <a16:creationId xmlns:a16="http://schemas.microsoft.com/office/drawing/2014/main" id="{8FF41D02-881F-48A5-B4AD-941998DAF8A2}"/>
+              </a:ext>
+            </a:extLst>
+          </p:cNvPr>
+          <p:cNvSpPr/>
+          <p:nvPr/>
+        </p:nvSpPr>
+        <p:spPr>
+          <a:xfrm>
+            <a:off x="914399" y="1078181"/>
+            <a:ext cx="10413507" cy="3139321"/>
+          </a:xfrm>
+          <a:prstGeom prst="rect">
+            <a:avLst/>
+          </a:prstGeom>
+        </p:spPr>
+        <p:txBody>
+          <a:bodyPr wrap="square">
+            <a:spAutoFit/>
+          </a:bodyPr>
+          <a:lstStyle/>
+          <a:p>
+            <a:endParaRPr lang="en-US" dirty="0"/>
+          </a:p>
+          <a:p>
+            <a:endParaRPr lang="en-US" dirty="0"/>
+          </a:p>
+          <a:p>
+            <a:endParaRPr lang="en-US" dirty="0"/>
+          </a:p>
+          <a:p>
+            <a:endParaRPr lang="en-US" dirty="0"/>
+          </a:p>
+          <a:p>
+            <a:endParaRPr lang="en-US" dirty="0"/>
+          </a:p>
+          <a:p>
+            <a:endParaRPr lang="en-US" dirty="0"/>
+          </a:p>
+          <a:p>
+            <a:endParaRPr lang="en-US" dirty="0"/>
+          </a:p>
+          <a:p>
+            <a:pPr algn="just"/>
+            <a:r>
+              <a:rPr lang="en-US" dirty="0"/>
+              <a:t>Contains information related to version number and other contact info about the developer. You can also change the language and close active workbooks and unload the plugin from excel until next run. </a:t>
+            </a:r>
+            <a:r>
+              <a:rPr lang="en-US" dirty="0">
+                <a:solidFill>
+                  <a:srgbClr val="FF0000"/>
+                </a:solidFill>
+              </a:rPr>
+              <a:t>It also checks for the latest version and resets the Ribbon interface.</a:t>
+            </a:r>
+          </a:p>
+          <a:p>
+            <a:pPr algn="just"/>
+            <a:r>
+              <a:rPr lang="en-US" dirty="0"/>
+              <a:t>It is the default Section for any new projects.</a:t>
+            </a:r>
+          </a:p>
+        </p:txBody>
+      </p:sp>
       <p:pic>
         <p:nvPicPr>
-          <p:cNvPr id="6" name="Content Placeholder 5">
+          <p:cNvPr id="7" name="Picture 6">
             <a:extLst>
               <a:ext uri="{FF2B5EF4-FFF2-40B4-BE49-F238E27FC236}">
-                <a16:creationId xmlns:a16="http://schemas.microsoft.com/office/drawing/2014/main" id="{97C44869-CB37-4762-B1EF-2E260A07F5D1}"/>
+                <a16:creationId xmlns:a16="http://schemas.microsoft.com/office/drawing/2014/main" id="{3FF4C469-FEC8-470D-9579-C0D94D43FF02}"/>
               </a:ext>
             </a:extLst>
           </p:cNvPr>
           <p:cNvPicPr>
-            <a:picLocks noGrp="1" noChangeAspect="1"/>
+            <a:picLocks noChangeAspect="1"/>
           </p:cNvPicPr>
-          <p:nvPr>
-            <p:ph idx="4294967295"/>
-          </p:nvPr>
+          <p:nvPr/>
         </p:nvPicPr>
         <p:blipFill>
           <a:blip r:embed="rId2">
@@ -4655,9 +4905,356 @@
         </p:blipFill>
         <p:spPr>
           <a:xfrm>
-            <a:off x="914400" y="3691755"/>
-            <a:ext cx="10515600" cy="2686050"/>
-          </a:xfrm>
+            <a:off x="914399" y="1078181"/>
+            <a:ext cx="10241905" cy="1626815"/>
+          </a:xfrm>
+          <a:prstGeom prst="rect">
+            <a:avLst/>
+          </a:prstGeom>
+        </p:spPr>
+      </p:pic>
+      <p:sp>
+        <p:nvSpPr>
+          <p:cNvPr id="4" name="Rectangle 3">
+            <a:extLst>
+              <a:ext uri="{FF2B5EF4-FFF2-40B4-BE49-F238E27FC236}">
+                <a16:creationId xmlns:a16="http://schemas.microsoft.com/office/drawing/2014/main" id="{46584488-A7B0-4804-8E93-ECDBB1E6AF8C}"/>
+              </a:ext>
+            </a:extLst>
+          </p:cNvPr>
+          <p:cNvSpPr/>
+          <p:nvPr/>
+        </p:nvSpPr>
+        <p:spPr>
+          <a:xfrm>
+            <a:off x="914399" y="1373251"/>
+            <a:ext cx="855248" cy="577048"/>
+          </a:xfrm>
+          <a:prstGeom prst="rect">
+            <a:avLst/>
+          </a:prstGeom>
+          <a:noFill/>
+          <a:ln>
+            <a:solidFill>
+              <a:srgbClr val="FF0000"/>
+            </a:solidFill>
+          </a:ln>
+        </p:spPr>
+        <p:style>
+          <a:lnRef idx="2">
+            <a:schemeClr val="accent1">
+              <a:shade val="50000"/>
+            </a:schemeClr>
+          </a:lnRef>
+          <a:fillRef idx="1">
+            <a:schemeClr val="accent1"/>
+          </a:fillRef>
+          <a:effectRef idx="0">
+            <a:schemeClr val="accent1"/>
+          </a:effectRef>
+          <a:fontRef idx="minor">
+            <a:schemeClr val="lt1"/>
+          </a:fontRef>
+        </p:style>
+        <p:txBody>
+          <a:bodyPr rtlCol="0" anchor="ctr"/>
+          <a:lstStyle/>
+          <a:p>
+            <a:pPr algn="ctr"/>
+            <a:endParaRPr lang="en-DK"/>
+          </a:p>
+        </p:txBody>
+      </p:sp>
+    </p:spTree>
+    <p:extLst>
+      <p:ext uri="{BB962C8B-B14F-4D97-AF65-F5344CB8AC3E}">
+        <p14:creationId xmlns:p14="http://schemas.microsoft.com/office/powerpoint/2010/main" val="2107318135"/>
+      </p:ext>
+    </p:extLst>
+  </p:cSld>
+  <p:clrMapOvr>
+    <a:masterClrMapping/>
+  </p:clrMapOvr>
+</p:sld>
+</file>
+
+<file path=ppt/slides/slide5.xml><?xml version="1.0" encoding="utf-8"?>
+<p:sld xmlns:a="http://schemas.openxmlformats.org/drawingml/2006/main" xmlns:r="http://schemas.openxmlformats.org/officeDocument/2006/relationships" xmlns:p="http://schemas.openxmlformats.org/presentationml/2006/main">
+  <p:cSld>
+    <p:spTree>
+      <p:nvGrpSpPr>
+        <p:cNvPr id="1" name=""/>
+        <p:cNvGrpSpPr/>
+        <p:nvPr/>
+      </p:nvGrpSpPr>
+      <p:grpSpPr>
+        <a:xfrm>
+          <a:off x="0" y="0"/>
+          <a:ext cx="0" cy="0"/>
+          <a:chOff x="0" y="0"/>
+          <a:chExt cx="0" cy="0"/>
+        </a:xfrm>
+      </p:grpSpPr>
+      <p:pic>
+        <p:nvPicPr>
+          <p:cNvPr id="11" name="Picture 10">
+            <a:extLst>
+              <a:ext uri="{FF2B5EF4-FFF2-40B4-BE49-F238E27FC236}">
+                <a16:creationId xmlns:a16="http://schemas.microsoft.com/office/drawing/2014/main" id="{3EAD26FA-7335-4C2D-90B2-FCB928D603AA}"/>
+              </a:ext>
+            </a:extLst>
+          </p:cNvPr>
+          <p:cNvPicPr>
+            <a:picLocks noChangeAspect="1"/>
+          </p:cNvPicPr>
+          <p:nvPr/>
+        </p:nvPicPr>
+        <p:blipFill>
+          <a:blip r:embed="rId2">
+            <a:extLst>
+              <a:ext uri="{28A0092B-C50C-407E-A947-70E740481C1C}">
+                <a14:useLocalDpi xmlns:a14="http://schemas.microsoft.com/office/drawing/2010/main" val="0"/>
+              </a:ext>
+            </a:extLst>
+          </a:blip>
+          <a:stretch>
+            <a:fillRect/>
+          </a:stretch>
+        </p:blipFill>
+        <p:spPr>
+          <a:xfrm>
+            <a:off x="914399" y="1063853"/>
+            <a:ext cx="10241905" cy="1626815"/>
+          </a:xfrm>
+          <a:prstGeom prst="rect">
+            <a:avLst/>
+          </a:prstGeom>
+        </p:spPr>
+      </p:pic>
+      <p:sp>
+        <p:nvSpPr>
+          <p:cNvPr id="10" name="Title 9">
+            <a:extLst>
+              <a:ext uri="{FF2B5EF4-FFF2-40B4-BE49-F238E27FC236}">
+                <a16:creationId xmlns:a16="http://schemas.microsoft.com/office/drawing/2014/main" id="{075C7462-EC0F-4D68-9952-92573D54C26C}"/>
+              </a:ext>
+            </a:extLst>
+          </p:cNvPr>
+          <p:cNvSpPr>
+            <a:spLocks noGrp="1"/>
+          </p:cNvSpPr>
+          <p:nvPr>
+            <p:ph type="title"/>
+          </p:nvPr>
+        </p:nvSpPr>
+        <p:spPr>
+          <a:xfrm>
+            <a:off x="914400" y="346230"/>
+            <a:ext cx="10058400" cy="559292"/>
+          </a:xfrm>
+        </p:spPr>
+        <p:txBody>
+          <a:bodyPr>
+            <a:normAutofit fontScale="90000"/>
+          </a:bodyPr>
+          <a:lstStyle/>
+          <a:p>
+            <a:r>
+              <a:rPr lang="en-US" b="1" dirty="0"/>
+              <a:t>Add Containers and Pages Section</a:t>
+            </a:r>
+            <a:endParaRPr lang="en-DK" dirty="0"/>
+          </a:p>
+        </p:txBody>
+      </p:sp>
+      <p:sp>
+        <p:nvSpPr>
+          <p:cNvPr id="9" name="Footer Placeholder 8">
+            <a:extLst>
+              <a:ext uri="{FF2B5EF4-FFF2-40B4-BE49-F238E27FC236}">
+                <a16:creationId xmlns:a16="http://schemas.microsoft.com/office/drawing/2014/main" id="{60D1BBA5-12BC-45B2-9AB4-96ED4FFC6E4D}"/>
+              </a:ext>
+            </a:extLst>
+          </p:cNvPr>
+          <p:cNvSpPr>
+            <a:spLocks noGrp="1"/>
+          </p:cNvSpPr>
+          <p:nvPr>
+            <p:ph type="ftr" sz="quarter" idx="11"/>
+          </p:nvPr>
+        </p:nvSpPr>
+        <p:spPr>
+          <a:xfrm>
+            <a:off x="10948725" y="6422313"/>
+            <a:ext cx="962549" cy="404614"/>
+          </a:xfrm>
+        </p:spPr>
+        <p:txBody>
+          <a:bodyPr/>
+          <a:lstStyle/>
+          <a:p>
+            <a:r>
+              <a:rPr lang="en-US" dirty="0"/>
+              <a:t>@</a:t>
+            </a:r>
+            <a:r>
+              <a:rPr lang="en-US" dirty="0" err="1"/>
+              <a:t>DexTools</a:t>
+            </a:r>
+            <a:endParaRPr lang="en-US" dirty="0"/>
+          </a:p>
+        </p:txBody>
+      </p:sp>
+      <p:sp>
+        <p:nvSpPr>
+          <p:cNvPr id="2" name="Rectangle 1">
+            <a:extLst>
+              <a:ext uri="{FF2B5EF4-FFF2-40B4-BE49-F238E27FC236}">
+                <a16:creationId xmlns:a16="http://schemas.microsoft.com/office/drawing/2014/main" id="{8FF41D02-881F-48A5-B4AD-941998DAF8A2}"/>
+              </a:ext>
+            </a:extLst>
+          </p:cNvPr>
+          <p:cNvSpPr/>
+          <p:nvPr/>
+        </p:nvSpPr>
+        <p:spPr>
+          <a:xfrm>
+            <a:off x="914399" y="1078181"/>
+            <a:ext cx="10413507" cy="2862322"/>
+          </a:xfrm>
+          <a:prstGeom prst="rect">
+            <a:avLst/>
+          </a:prstGeom>
+        </p:spPr>
+        <p:txBody>
+          <a:bodyPr wrap="square">
+            <a:spAutoFit/>
+          </a:bodyPr>
+          <a:lstStyle/>
+          <a:p>
+            <a:endParaRPr lang="en-US" dirty="0"/>
+          </a:p>
+          <a:p>
+            <a:endParaRPr lang="en-US" dirty="0"/>
+          </a:p>
+          <a:p>
+            <a:endParaRPr lang="en-US" dirty="0"/>
+          </a:p>
+          <a:p>
+            <a:endParaRPr lang="en-US" dirty="0"/>
+          </a:p>
+          <a:p>
+            <a:endParaRPr lang="en-US" dirty="0"/>
+          </a:p>
+          <a:p>
+            <a:endParaRPr lang="en-US" dirty="0"/>
+          </a:p>
+          <a:p>
+            <a:endParaRPr lang="en-US" dirty="0"/>
+          </a:p>
+          <a:p>
+            <a:pPr algn="just"/>
+            <a:r>
+              <a:rPr lang="en-US" dirty="0"/>
+              <a:t>Contains buttons for adding new Projects (via wizard) of type add-in or macro enabled, and adding new Pages container with no macro code that just holds the information. The latest can be used for holding the data for tests, parsers, etc. </a:t>
+            </a:r>
+            <a:r>
+              <a:rPr lang="en-US" dirty="0">
+                <a:solidFill>
+                  <a:srgbClr val="FF0000"/>
+                </a:solidFill>
+              </a:rPr>
+              <a:t>It also allows to export and import page structure and data in json format.</a:t>
+            </a:r>
+          </a:p>
+        </p:txBody>
+      </p:sp>
+      <p:sp>
+        <p:nvSpPr>
+          <p:cNvPr id="4" name="Rectangle 3">
+            <a:extLst>
+              <a:ext uri="{FF2B5EF4-FFF2-40B4-BE49-F238E27FC236}">
+                <a16:creationId xmlns:a16="http://schemas.microsoft.com/office/drawing/2014/main" id="{46584488-A7B0-4804-8E93-ECDBB1E6AF8C}"/>
+              </a:ext>
+            </a:extLst>
+          </p:cNvPr>
+          <p:cNvSpPr/>
+          <p:nvPr/>
+        </p:nvSpPr>
+        <p:spPr>
+          <a:xfrm>
+            <a:off x="1704482" y="1384917"/>
+            <a:ext cx="1447089" cy="577048"/>
+          </a:xfrm>
+          <a:prstGeom prst="rect">
+            <a:avLst/>
+          </a:prstGeom>
+          <a:noFill/>
+          <a:ln>
+            <a:solidFill>
+              <a:srgbClr val="FF0000"/>
+            </a:solidFill>
+          </a:ln>
+        </p:spPr>
+        <p:style>
+          <a:lnRef idx="2">
+            <a:schemeClr val="accent1">
+              <a:shade val="50000"/>
+            </a:schemeClr>
+          </a:lnRef>
+          <a:fillRef idx="1">
+            <a:schemeClr val="accent1"/>
+          </a:fillRef>
+          <a:effectRef idx="0">
+            <a:schemeClr val="accent1"/>
+          </a:effectRef>
+          <a:fontRef idx="minor">
+            <a:schemeClr val="lt1"/>
+          </a:fontRef>
+        </p:style>
+        <p:txBody>
+          <a:bodyPr rtlCol="0" anchor="ctr"/>
+          <a:lstStyle/>
+          <a:p>
+            <a:pPr algn="ctr"/>
+            <a:endParaRPr lang="en-DK"/>
+          </a:p>
+        </p:txBody>
+      </p:sp>
+      <p:pic>
+        <p:nvPicPr>
+          <p:cNvPr id="6" name="Picture 5">
+            <a:extLst>
+              <a:ext uri="{FF2B5EF4-FFF2-40B4-BE49-F238E27FC236}">
+                <a16:creationId xmlns:a16="http://schemas.microsoft.com/office/drawing/2014/main" id="{93FC67CA-AD63-45B4-80F4-D61E412F2462}"/>
+              </a:ext>
+            </a:extLst>
+          </p:cNvPr>
+          <p:cNvPicPr>
+            <a:picLocks noChangeAspect="1"/>
+          </p:cNvPicPr>
+          <p:nvPr/>
+        </p:nvPicPr>
+        <p:blipFill>
+          <a:blip r:embed="rId3">
+            <a:extLst>
+              <a:ext uri="{28A0092B-C50C-407E-A947-70E740481C1C}">
+                <a14:useLocalDpi xmlns:a14="http://schemas.microsoft.com/office/drawing/2010/main" val="0"/>
+              </a:ext>
+            </a:extLst>
+          </a:blip>
+          <a:stretch>
+            <a:fillRect/>
+          </a:stretch>
+        </p:blipFill>
+        <p:spPr>
+          <a:xfrm>
+            <a:off x="914399" y="4117890"/>
+            <a:ext cx="5486400" cy="2199256"/>
+          </a:xfrm>
+          <a:prstGeom prst="rect">
+            <a:avLst/>
+          </a:prstGeom>
         </p:spPr>
       </p:pic>
       <p:sp>
@@ -4665,7 +5262,7 @@
           <p:cNvPr id="7" name="TextBox 6">
             <a:extLst>
               <a:ext uri="{FF2B5EF4-FFF2-40B4-BE49-F238E27FC236}">
-                <a16:creationId xmlns:a16="http://schemas.microsoft.com/office/drawing/2014/main" id="{A290C55D-B2B0-4E09-BF2E-EF361CD1350C}"/>
+                <a16:creationId xmlns:a16="http://schemas.microsoft.com/office/drawing/2014/main" id="{65900D0B-34FD-4A56-AE6D-B1043BFA2993}"/>
               </a:ext>
             </a:extLst>
           </p:cNvPr>
@@ -4674,8 +5271,8 @@
         </p:nvSpPr>
         <p:spPr>
           <a:xfrm>
-            <a:off x="838200" y="989044"/>
-            <a:ext cx="10515600" cy="2585323"/>
+            <a:off x="6551720" y="4113162"/>
+            <a:ext cx="4887610" cy="2308324"/>
           </a:xfrm>
           <a:prstGeom prst="rect">
             <a:avLst/>
@@ -4688,48 +5285,328 @@
           </a:bodyPr>
           <a:lstStyle/>
           <a:p>
-            <a:pPr marL="342900" indent="-342900" algn="just">
-              <a:buAutoNum type="arabicPeriod"/>
-            </a:pPr>
+            <a:pPr algn="just"/>
             <a:r>
               <a:rPr lang="en-US" dirty="0"/>
-              <a:t>Make sure DexTools.xlam file is saved in a safe run location by adding the save folder path to File/Options/Trust Center/Trust Center Options/Trusted Locations </a:t>
-            </a:r>
-          </a:p>
-          <a:p>
-            <a:pPr marL="342900" indent="-342900" algn="just">
-              <a:buAutoNum type="arabicPeriod"/>
-            </a:pPr>
-            <a:r>
-              <a:rPr lang="en-US" dirty="0"/>
-              <a:t>Enable the trust access to the VBA project object model in File/Options/Trust Center/Trust Center Options/Macro Settings menu</a:t>
-            </a:r>
-          </a:p>
-          <a:p>
-            <a:pPr marL="342900" indent="-342900" algn="just">
-              <a:buAutoNum type="arabicPeriod"/>
-            </a:pPr>
-            <a:r>
-              <a:rPr lang="en-US" dirty="0"/>
-              <a:t>Install JavaScript testing excel library prior to running the macro from </a:t>
-            </a:r>
-            <a:r>
-              <a:rPr lang="en-US" dirty="0">
-                <a:hlinkClick r:id="rId3"/>
-              </a:rPr>
-              <a:t>https://github.com/florentbr/SeleniumBasic/releases/tag/v2.0.9.0</a:t>
-            </a:r>
-            <a:r>
-              <a:rPr lang="en-US" dirty="0"/>
-              <a:t>. This library is used in testing JavaScript functions by executing shell commands against several known web browsers that also need  to be installed on the testing machine. The Java Script testing is still buggy and will be fully enabled at a later stage.</a:t>
-            </a:r>
+              <a:t>The add new project Wizard allows you to create a new project and inject some general code according to the project type to help you start developing macro enabled projects. It will be extended to allow all office suite macro enabled project types ( Excel, Word, Access, PowerPoint). It also generates an Excel Container file that can be used for testing the code.</a:t>
+            </a:r>
+            <a:endParaRPr lang="en-DK" dirty="0"/>
           </a:p>
         </p:txBody>
       </p:sp>
     </p:spTree>
     <p:extLst>
       <p:ext uri="{BB962C8B-B14F-4D97-AF65-F5344CB8AC3E}">
-        <p14:creationId xmlns:p14="http://schemas.microsoft.com/office/powerpoint/2010/main" val="2892646149"/>
+        <p14:creationId xmlns:p14="http://schemas.microsoft.com/office/powerpoint/2010/main" val="1320421528"/>
+      </p:ext>
+    </p:extLst>
+  </p:cSld>
+  <p:clrMapOvr>
+    <a:masterClrMapping/>
+  </p:clrMapOvr>
+</p:sld>
+</file>
+
+<file path=ppt/slides/slide6.xml><?xml version="1.0" encoding="utf-8"?>
+<p:sld xmlns:a="http://schemas.openxmlformats.org/drawingml/2006/main" xmlns:r="http://schemas.openxmlformats.org/officeDocument/2006/relationships" xmlns:p="http://schemas.openxmlformats.org/presentationml/2006/main">
+  <p:cSld>
+    <p:spTree>
+      <p:nvGrpSpPr>
+        <p:cNvPr id="1" name=""/>
+        <p:cNvGrpSpPr/>
+        <p:nvPr/>
+      </p:nvGrpSpPr>
+      <p:grpSpPr>
+        <a:xfrm>
+          <a:off x="0" y="0"/>
+          <a:ext cx="0" cy="0"/>
+          <a:chOff x="0" y="0"/>
+          <a:chExt cx="0" cy="0"/>
+        </a:xfrm>
+      </p:grpSpPr>
+      <p:sp>
+        <p:nvSpPr>
+          <p:cNvPr id="10" name="Title 9">
+            <a:extLst>
+              <a:ext uri="{FF2B5EF4-FFF2-40B4-BE49-F238E27FC236}">
+                <a16:creationId xmlns:a16="http://schemas.microsoft.com/office/drawing/2014/main" id="{075C7462-EC0F-4D68-9952-92573D54C26C}"/>
+              </a:ext>
+            </a:extLst>
+          </p:cNvPr>
+          <p:cNvSpPr>
+            <a:spLocks noGrp="1"/>
+          </p:cNvSpPr>
+          <p:nvPr>
+            <p:ph type="title"/>
+          </p:nvPr>
+        </p:nvSpPr>
+        <p:spPr>
+          <a:xfrm>
+            <a:off x="914400" y="346230"/>
+            <a:ext cx="10058400" cy="559292"/>
+          </a:xfrm>
+        </p:spPr>
+        <p:txBody>
+          <a:bodyPr>
+            <a:normAutofit fontScale="90000"/>
+          </a:bodyPr>
+          <a:lstStyle/>
+          <a:p>
+            <a:r>
+              <a:rPr lang="en-US" b="1" dirty="0"/>
+              <a:t>Tools Section</a:t>
+            </a:r>
+            <a:endParaRPr lang="en-DK" dirty="0"/>
+          </a:p>
+        </p:txBody>
+      </p:sp>
+      <p:sp>
+        <p:nvSpPr>
+          <p:cNvPr id="9" name="Footer Placeholder 8">
+            <a:extLst>
+              <a:ext uri="{FF2B5EF4-FFF2-40B4-BE49-F238E27FC236}">
+                <a16:creationId xmlns:a16="http://schemas.microsoft.com/office/drawing/2014/main" id="{60D1BBA5-12BC-45B2-9AB4-96ED4FFC6E4D}"/>
+              </a:ext>
+            </a:extLst>
+          </p:cNvPr>
+          <p:cNvSpPr>
+            <a:spLocks noGrp="1"/>
+          </p:cNvSpPr>
+          <p:nvPr>
+            <p:ph type="ftr" sz="quarter" idx="11"/>
+          </p:nvPr>
+        </p:nvSpPr>
+        <p:spPr>
+          <a:xfrm>
+            <a:off x="10948725" y="6422313"/>
+            <a:ext cx="962549" cy="404614"/>
+          </a:xfrm>
+        </p:spPr>
+        <p:txBody>
+          <a:bodyPr/>
+          <a:lstStyle/>
+          <a:p>
+            <a:r>
+              <a:rPr lang="en-US" dirty="0"/>
+              <a:t>@</a:t>
+            </a:r>
+            <a:r>
+              <a:rPr lang="en-US" dirty="0" err="1"/>
+              <a:t>DexTools</a:t>
+            </a:r>
+            <a:endParaRPr lang="en-US" dirty="0"/>
+          </a:p>
+        </p:txBody>
+      </p:sp>
+      <p:sp>
+        <p:nvSpPr>
+          <p:cNvPr id="2" name="Rectangle 1">
+            <a:extLst>
+              <a:ext uri="{FF2B5EF4-FFF2-40B4-BE49-F238E27FC236}">
+                <a16:creationId xmlns:a16="http://schemas.microsoft.com/office/drawing/2014/main" id="{8FF41D02-881F-48A5-B4AD-941998DAF8A2}"/>
+              </a:ext>
+            </a:extLst>
+          </p:cNvPr>
+          <p:cNvSpPr/>
+          <p:nvPr/>
+        </p:nvSpPr>
+        <p:spPr>
+          <a:xfrm>
+            <a:off x="914399" y="1078181"/>
+            <a:ext cx="10413507" cy="3693319"/>
+          </a:xfrm>
+          <a:prstGeom prst="rect">
+            <a:avLst/>
+          </a:prstGeom>
+        </p:spPr>
+        <p:txBody>
+          <a:bodyPr wrap="square">
+            <a:spAutoFit/>
+          </a:bodyPr>
+          <a:lstStyle/>
+          <a:p>
+            <a:endParaRPr lang="en-US" dirty="0"/>
+          </a:p>
+          <a:p>
+            <a:endParaRPr lang="en-US" dirty="0"/>
+          </a:p>
+          <a:p>
+            <a:endParaRPr lang="en-US" dirty="0"/>
+          </a:p>
+          <a:p>
+            <a:endParaRPr lang="en-US" dirty="0"/>
+          </a:p>
+          <a:p>
+            <a:endParaRPr lang="en-US" dirty="0"/>
+          </a:p>
+          <a:p>
+            <a:endParaRPr lang="en-US" dirty="0"/>
+          </a:p>
+          <a:p>
+            <a:pPr algn="just"/>
+            <a:endParaRPr lang="en-US" dirty="0"/>
+          </a:p>
+          <a:p>
+            <a:pPr algn="just"/>
+            <a:r>
+              <a:rPr lang="en-US" dirty="0"/>
+              <a:t>Contains custom tools such as :</a:t>
+            </a:r>
+          </a:p>
+          <a:p>
+            <a:pPr marL="285750" indent="-285750" algn="just">
+              <a:buFontTx/>
+              <a:buChar char="-"/>
+            </a:pPr>
+            <a:r>
+              <a:rPr lang="en-US" dirty="0" err="1"/>
+              <a:t>ColorPicker</a:t>
+            </a:r>
+            <a:r>
+              <a:rPr lang="en-US" dirty="0"/>
+              <a:t> form launcher button.</a:t>
+            </a:r>
+          </a:p>
+          <a:p>
+            <a:pPr marL="285750" indent="-285750" algn="just">
+              <a:buFontTx/>
+              <a:buChar char="-"/>
+            </a:pPr>
+            <a:r>
+              <a:rPr lang="en-US" dirty="0" err="1"/>
+              <a:t>Addin</a:t>
+            </a:r>
+            <a:r>
+              <a:rPr lang="en-US" dirty="0"/>
+              <a:t>-Mode button that allows to switch between add-in or document mode form of current project </a:t>
+            </a:r>
+          </a:p>
+          <a:p>
+            <a:pPr algn="just"/>
+            <a:r>
+              <a:rPr lang="en-US" dirty="0"/>
+              <a:t>(default is </a:t>
+            </a:r>
+            <a:r>
+              <a:rPr lang="en-US" dirty="0" err="1"/>
+              <a:t>DexTools</a:t>
+            </a:r>
+            <a:r>
+              <a:rPr lang="en-US" dirty="0"/>
+              <a:t>) in order to modify the default pages and interface data pages.</a:t>
+            </a:r>
+          </a:p>
+          <a:p>
+            <a:pPr marL="285750" indent="-285750" algn="just">
+              <a:buFontTx/>
+              <a:buChar char="-"/>
+            </a:pPr>
+            <a:r>
+              <a:rPr lang="en-US" dirty="0"/>
+              <a:t>3 Extra buttons for tools to be added or linked to.</a:t>
+            </a:r>
+          </a:p>
+          <a:p>
+            <a:pPr marL="285750" indent="-285750" algn="just">
+              <a:buFontTx/>
+              <a:buChar char="-"/>
+            </a:pPr>
+            <a:endParaRPr lang="en-US" dirty="0"/>
+          </a:p>
+        </p:txBody>
+      </p:sp>
+      <p:pic>
+        <p:nvPicPr>
+          <p:cNvPr id="6" name="Picture 5">
+            <a:extLst>
+              <a:ext uri="{FF2B5EF4-FFF2-40B4-BE49-F238E27FC236}">
+                <a16:creationId xmlns:a16="http://schemas.microsoft.com/office/drawing/2014/main" id="{0484C831-F8A7-45AB-83C1-7E324090843F}"/>
+              </a:ext>
+            </a:extLst>
+          </p:cNvPr>
+          <p:cNvPicPr>
+            <a:picLocks noChangeAspect="1"/>
+          </p:cNvPicPr>
+          <p:nvPr/>
+        </p:nvPicPr>
+        <p:blipFill>
+          <a:blip r:embed="rId2">
+            <a:extLst>
+              <a:ext uri="{28A0092B-C50C-407E-A947-70E740481C1C}">
+                <a14:useLocalDpi xmlns:a14="http://schemas.microsoft.com/office/drawing/2010/main" val="0"/>
+              </a:ext>
+            </a:extLst>
+          </a:blip>
+          <a:stretch>
+            <a:fillRect/>
+          </a:stretch>
+        </p:blipFill>
+        <p:spPr>
+          <a:xfrm>
+            <a:off x="914399" y="1078181"/>
+            <a:ext cx="10241905" cy="1626815"/>
+          </a:xfrm>
+          <a:prstGeom prst="rect">
+            <a:avLst/>
+          </a:prstGeom>
+        </p:spPr>
+      </p:pic>
+      <p:sp>
+        <p:nvSpPr>
+          <p:cNvPr id="4" name="Rectangle 3">
+            <a:extLst>
+              <a:ext uri="{FF2B5EF4-FFF2-40B4-BE49-F238E27FC236}">
+                <a16:creationId xmlns:a16="http://schemas.microsoft.com/office/drawing/2014/main" id="{46584488-A7B0-4804-8E93-ECDBB1E6AF8C}"/>
+              </a:ext>
+            </a:extLst>
+          </p:cNvPr>
+          <p:cNvSpPr/>
+          <p:nvPr/>
+        </p:nvSpPr>
+        <p:spPr>
+          <a:xfrm>
+            <a:off x="3116034" y="1442404"/>
+            <a:ext cx="1420456" cy="577048"/>
+          </a:xfrm>
+          <a:prstGeom prst="rect">
+            <a:avLst/>
+          </a:prstGeom>
+          <a:noFill/>
+          <a:ln>
+            <a:solidFill>
+              <a:srgbClr val="FF0000"/>
+            </a:solidFill>
+          </a:ln>
+        </p:spPr>
+        <p:style>
+          <a:lnRef idx="2">
+            <a:schemeClr val="accent1">
+              <a:shade val="50000"/>
+            </a:schemeClr>
+          </a:lnRef>
+          <a:fillRef idx="1">
+            <a:schemeClr val="accent1"/>
+          </a:fillRef>
+          <a:effectRef idx="0">
+            <a:schemeClr val="accent1"/>
+          </a:effectRef>
+          <a:fontRef idx="minor">
+            <a:schemeClr val="lt1"/>
+          </a:fontRef>
+        </p:style>
+        <p:txBody>
+          <a:bodyPr rtlCol="0" anchor="ctr"/>
+          <a:lstStyle/>
+          <a:p>
+            <a:pPr algn="ctr"/>
+            <a:endParaRPr lang="en-DK"/>
+          </a:p>
+        </p:txBody>
+      </p:sp>
+    </p:spTree>
+    <p:extLst>
+      <p:ext uri="{BB962C8B-B14F-4D97-AF65-F5344CB8AC3E}">
+        <p14:creationId xmlns:p14="http://schemas.microsoft.com/office/powerpoint/2010/main" val="1135852911"/>
       </p:ext>
     </p:extLst>
   </p:cSld>

</xml_diff>

<commit_message>
Added guide skeleton and container sample
</commit_message>
<xml_diff>
--- a/Main/Guide.pptx
+++ b/Main/Guide.pptx
@@ -5,7 +5,7 @@
     <p:sldMasterId id="2147483660" r:id="rId1"/>
   </p:sldMasterIdLst>
   <p:notesMasterIdLst>
-    <p:notesMasterId r:id="rId8"/>
+    <p:notesMasterId r:id="rId12"/>
   </p:notesMasterIdLst>
   <p:sldIdLst>
     <p:sldId id="256" r:id="rId2"/>
@@ -14,6 +14,10 @@
     <p:sldId id="259" r:id="rId5"/>
     <p:sldId id="261" r:id="rId6"/>
     <p:sldId id="260" r:id="rId7"/>
+    <p:sldId id="262" r:id="rId8"/>
+    <p:sldId id="263" r:id="rId9"/>
+    <p:sldId id="264" r:id="rId10"/>
+    <p:sldId id="265" r:id="rId11"/>
   </p:sldIdLst>
   <p:sldSz cx="12192000" cy="6858000"/>
   <p:notesSz cx="6858000" cy="9144000"/>
@@ -127,6 +131,10 @@
             <p14:sldId id="259"/>
             <p14:sldId id="261"/>
             <p14:sldId id="260"/>
+            <p14:sldId id="262"/>
+            <p14:sldId id="263"/>
+            <p14:sldId id="264"/>
+            <p14:sldId id="265"/>
           </p14:sldIdLst>
         </p14:section>
       </p14:sectionLst>
@@ -220,7 +228,7 @@
           <a:p>
             <a:fld id="{3611CF13-303D-440F-943E-B3356A10441D}" type="datetimeFigureOut">
               <a:rPr lang="en-DK" smtClean="0"/>
-              <a:t>19/06/2018</a:t>
+              <a:t>20/06/2018</a:t>
             </a:fld>
             <a:endParaRPr lang="en-DK"/>
           </a:p>
@@ -657,7 +665,7 @@
           <a:p>
             <a:fld id="{8A1C8D9D-9C9D-4235-A5A7-283321EF4101}" type="datetime1">
               <a:rPr lang="en-US" smtClean="0"/>
-              <a:t>6/19/2018</a:t>
+              <a:t>6/20/2018</a:t>
             </a:fld>
             <a:endParaRPr lang="en-US"/>
           </a:p>
@@ -987,7 +995,7 @@
           <a:p>
             <a:fld id="{2D422E4B-4577-4A02-A6EC-E2D1EF7F9B60}" type="datetime1">
               <a:rPr lang="en-US" smtClean="0"/>
-              <a:t>6/19/2018</a:t>
+              <a:t>6/20/2018</a:t>
             </a:fld>
             <a:endParaRPr lang="en-US"/>
           </a:p>
@@ -1167,7 +1175,7 @@
           <a:p>
             <a:fld id="{F9F4D710-76D7-4C8B-99F4-EB2753F48968}" type="datetime1">
               <a:rPr lang="en-US" smtClean="0"/>
-              <a:t>6/19/2018</a:t>
+              <a:t>6/20/2018</a:t>
             </a:fld>
             <a:endParaRPr lang="en-US"/>
           </a:p>
@@ -1337,7 +1345,7 @@
           <a:p>
             <a:fld id="{D6EAC811-E058-4F2B-AC96-AB888D217E60}" type="datetime1">
               <a:rPr lang="en-US" smtClean="0"/>
-              <a:t>6/19/2018</a:t>
+              <a:t>6/20/2018</a:t>
             </a:fld>
             <a:endParaRPr lang="en-US"/>
           </a:p>
@@ -1614,7 +1622,7 @@
           <a:p>
             <a:fld id="{59C0C240-8E4D-4595-A4C8-46263B309462}" type="datetime1">
               <a:rPr lang="en-US" smtClean="0"/>
-              <a:t>6/19/2018</a:t>
+              <a:t>6/20/2018</a:t>
             </a:fld>
             <a:endParaRPr lang="en-US"/>
           </a:p>
@@ -2008,7 +2016,7 @@
           <a:p>
             <a:fld id="{D6BCF197-D500-4E47-A7D8-74AA889E9EA7}" type="datetime1">
               <a:rPr lang="en-US" smtClean="0"/>
-              <a:t>6/19/2018</a:t>
+              <a:t>6/20/2018</a:t>
             </a:fld>
             <a:endParaRPr lang="en-US"/>
           </a:p>
@@ -2485,7 +2493,7 @@
           <a:p>
             <a:fld id="{00E1FA4D-ABE3-4779-931E-8B537AE85CC5}" type="datetime1">
               <a:rPr lang="en-US" smtClean="0"/>
-              <a:t>6/19/2018</a:t>
+              <a:t>6/20/2018</a:t>
             </a:fld>
             <a:endParaRPr lang="en-US"/>
           </a:p>
@@ -2603,7 +2611,7 @@
           <a:p>
             <a:fld id="{CE6C3149-CC30-4DED-BA4C-09413572D021}" type="datetime1">
               <a:rPr lang="en-US" smtClean="0"/>
-              <a:t>6/19/2018</a:t>
+              <a:t>6/20/2018</a:t>
             </a:fld>
             <a:endParaRPr lang="en-US"/>
           </a:p>
@@ -2698,7 +2706,7 @@
           <a:p>
             <a:fld id="{23CE8408-ADA6-49FE-9A1B-B0F697D31E14}" type="datetime1">
               <a:rPr lang="en-US" smtClean="0"/>
-              <a:t>6/19/2018</a:t>
+              <a:t>6/20/2018</a:t>
             </a:fld>
             <a:endParaRPr lang="en-US"/>
           </a:p>
@@ -3044,7 +3052,7 @@
           <a:p>
             <a:fld id="{061EFC8C-A7EC-40AE-8893-5D3C30F84FF8}" type="datetime1">
               <a:rPr lang="en-US" smtClean="0"/>
-              <a:t>6/19/2018</a:t>
+              <a:t>6/20/2018</a:t>
             </a:fld>
             <a:endParaRPr lang="en-US"/>
           </a:p>
@@ -3432,7 +3440,7 @@
           <a:p>
             <a:fld id="{99901679-4BC0-453E-8BD2-B5E4353EEFBC}" type="datetime1">
               <a:rPr lang="en-US" smtClean="0"/>
-              <a:t>6/19/2018</a:t>
+              <a:t>6/20/2018</a:t>
             </a:fld>
             <a:endParaRPr lang="en-US"/>
           </a:p>
@@ -3710,7 +3718,7 @@
           <a:p>
             <a:fld id="{020CC676-0883-4A79-B4EA-07871FC52BB8}" type="datetime1">
               <a:rPr lang="en-US" smtClean="0"/>
-              <a:t>6/19/2018</a:t>
+              <a:t>6/20/2018</a:t>
             </a:fld>
             <a:endParaRPr lang="en-US"/>
           </a:p>
@@ -4274,6 +4282,291 @@
 </p:sld>
 </file>
 
+<file path=ppt/slides/slide10.xml><?xml version="1.0" encoding="utf-8"?>
+<p:sld xmlns:a="http://schemas.openxmlformats.org/drawingml/2006/main" xmlns:r="http://schemas.openxmlformats.org/officeDocument/2006/relationships" xmlns:p="http://schemas.openxmlformats.org/presentationml/2006/main">
+  <p:cSld>
+    <p:spTree>
+      <p:nvGrpSpPr>
+        <p:cNvPr id="1" name=""/>
+        <p:cNvGrpSpPr/>
+        <p:nvPr/>
+      </p:nvGrpSpPr>
+      <p:grpSpPr>
+        <a:xfrm>
+          <a:off x="0" y="0"/>
+          <a:ext cx="0" cy="0"/>
+          <a:chOff x="0" y="0"/>
+          <a:chExt cx="0" cy="0"/>
+        </a:xfrm>
+      </p:grpSpPr>
+      <p:sp>
+        <p:nvSpPr>
+          <p:cNvPr id="2" name="Rectangle 1">
+            <a:extLst>
+              <a:ext uri="{FF2B5EF4-FFF2-40B4-BE49-F238E27FC236}">
+                <a16:creationId xmlns:a16="http://schemas.microsoft.com/office/drawing/2014/main" id="{8FF41D02-881F-48A5-B4AD-941998DAF8A2}"/>
+              </a:ext>
+            </a:extLst>
+          </p:cNvPr>
+          <p:cNvSpPr/>
+          <p:nvPr/>
+        </p:nvSpPr>
+        <p:spPr>
+          <a:xfrm>
+            <a:off x="914399" y="1078181"/>
+            <a:ext cx="10413507" cy="4247317"/>
+          </a:xfrm>
+          <a:prstGeom prst="rect">
+            <a:avLst/>
+          </a:prstGeom>
+        </p:spPr>
+        <p:txBody>
+          <a:bodyPr wrap="square">
+            <a:spAutoFit/>
+          </a:bodyPr>
+          <a:lstStyle/>
+          <a:p>
+            <a:endParaRPr lang="en-US" dirty="0"/>
+          </a:p>
+          <a:p>
+            <a:endParaRPr lang="en-US" dirty="0"/>
+          </a:p>
+          <a:p>
+            <a:endParaRPr lang="en-US" dirty="0"/>
+          </a:p>
+          <a:p>
+            <a:endParaRPr lang="en-US" dirty="0"/>
+          </a:p>
+          <a:p>
+            <a:endParaRPr lang="en-US" dirty="0"/>
+          </a:p>
+          <a:p>
+            <a:endParaRPr lang="en-US" dirty="0"/>
+          </a:p>
+          <a:p>
+            <a:endParaRPr lang="en-US" dirty="0"/>
+          </a:p>
+          <a:p>
+            <a:endParaRPr lang="en-US" dirty="0"/>
+          </a:p>
+          <a:p>
+            <a:endParaRPr lang="en-US" dirty="0"/>
+          </a:p>
+          <a:p>
+            <a:endParaRPr lang="en-US" dirty="0"/>
+          </a:p>
+          <a:p>
+            <a:r>
+              <a:rPr lang="en-US" dirty="0"/>
+              <a:t>Contains all functions to read/run/edit user forms </a:t>
+            </a:r>
+          </a:p>
+          <a:p>
+            <a:endParaRPr lang="en-US" dirty="0"/>
+          </a:p>
+          <a:p>
+            <a:r>
+              <a:rPr lang="en-US" dirty="0"/>
+              <a:t>Some planned improvements: </a:t>
+            </a:r>
+          </a:p>
+          <a:p>
+            <a:pPr marL="285750" indent="-285750">
+              <a:buFontTx/>
+              <a:buChar char="-"/>
+            </a:pPr>
+            <a:r>
+              <a:rPr lang="en-US" dirty="0"/>
+              <a:t>export/import serialized forms</a:t>
+            </a:r>
+          </a:p>
+          <a:p>
+            <a:pPr marL="285750" indent="-285750">
+              <a:buFontTx/>
+              <a:buChar char="-"/>
+            </a:pPr>
+            <a:r>
+              <a:rPr lang="en-US" dirty="0"/>
+              <a:t>add more tests</a:t>
+            </a:r>
+          </a:p>
+        </p:txBody>
+      </p:sp>
+      <p:sp>
+        <p:nvSpPr>
+          <p:cNvPr id="10" name="Title 9">
+            <a:extLst>
+              <a:ext uri="{FF2B5EF4-FFF2-40B4-BE49-F238E27FC236}">
+                <a16:creationId xmlns:a16="http://schemas.microsoft.com/office/drawing/2014/main" id="{075C7462-EC0F-4D68-9952-92573D54C26C}"/>
+              </a:ext>
+            </a:extLst>
+          </p:cNvPr>
+          <p:cNvSpPr>
+            <a:spLocks noGrp="1"/>
+          </p:cNvSpPr>
+          <p:nvPr>
+            <p:ph type="title"/>
+          </p:nvPr>
+        </p:nvSpPr>
+        <p:spPr>
+          <a:xfrm>
+            <a:off x="914400" y="346230"/>
+            <a:ext cx="10058400" cy="559292"/>
+          </a:xfrm>
+        </p:spPr>
+        <p:txBody>
+          <a:bodyPr>
+            <a:normAutofit fontScale="90000"/>
+          </a:bodyPr>
+          <a:lstStyle/>
+          <a:p>
+            <a:r>
+              <a:rPr lang="en-US" b="1" dirty="0"/>
+              <a:t>Form Runner/Editor</a:t>
+            </a:r>
+            <a:endParaRPr lang="en-DK" dirty="0"/>
+          </a:p>
+        </p:txBody>
+      </p:sp>
+      <p:sp>
+        <p:nvSpPr>
+          <p:cNvPr id="9" name="Footer Placeholder 8">
+            <a:extLst>
+              <a:ext uri="{FF2B5EF4-FFF2-40B4-BE49-F238E27FC236}">
+                <a16:creationId xmlns:a16="http://schemas.microsoft.com/office/drawing/2014/main" id="{60D1BBA5-12BC-45B2-9AB4-96ED4FFC6E4D}"/>
+              </a:ext>
+            </a:extLst>
+          </p:cNvPr>
+          <p:cNvSpPr>
+            <a:spLocks noGrp="1"/>
+          </p:cNvSpPr>
+          <p:nvPr>
+            <p:ph type="ftr" sz="quarter" idx="11"/>
+          </p:nvPr>
+        </p:nvSpPr>
+        <p:spPr>
+          <a:xfrm>
+            <a:off x="10948725" y="6422313"/>
+            <a:ext cx="962549" cy="404614"/>
+          </a:xfrm>
+        </p:spPr>
+        <p:txBody>
+          <a:bodyPr/>
+          <a:lstStyle/>
+          <a:p>
+            <a:r>
+              <a:rPr lang="en-US" dirty="0"/>
+              <a:t>@</a:t>
+            </a:r>
+            <a:r>
+              <a:rPr lang="en-US" dirty="0" err="1"/>
+              <a:t>DexTools</a:t>
+            </a:r>
+            <a:endParaRPr lang="en-US" dirty="0"/>
+          </a:p>
+        </p:txBody>
+      </p:sp>
+      <p:pic>
+        <p:nvPicPr>
+          <p:cNvPr id="4" name="Picture 3">
+            <a:extLst>
+              <a:ext uri="{FF2B5EF4-FFF2-40B4-BE49-F238E27FC236}">
+                <a16:creationId xmlns:a16="http://schemas.microsoft.com/office/drawing/2014/main" id="{DA966AA6-0B2E-4A27-9A55-0BE40E46B897}"/>
+              </a:ext>
+            </a:extLst>
+          </p:cNvPr>
+          <p:cNvPicPr>
+            <a:picLocks noChangeAspect="1"/>
+          </p:cNvPicPr>
+          <p:nvPr/>
+        </p:nvPicPr>
+        <p:blipFill>
+          <a:blip r:embed="rId2">
+            <a:extLst>
+              <a:ext uri="{28A0092B-C50C-407E-A947-70E740481C1C}">
+                <a14:useLocalDpi xmlns:a14="http://schemas.microsoft.com/office/drawing/2010/main" val="0"/>
+              </a:ext>
+            </a:extLst>
+          </a:blip>
+          <a:stretch>
+            <a:fillRect/>
+          </a:stretch>
+        </p:blipFill>
+        <p:spPr>
+          <a:xfrm>
+            <a:off x="914399" y="1078182"/>
+            <a:ext cx="10273005" cy="2468956"/>
+          </a:xfrm>
+          <a:prstGeom prst="rect">
+            <a:avLst/>
+          </a:prstGeom>
+        </p:spPr>
+      </p:pic>
+      <p:sp>
+        <p:nvSpPr>
+          <p:cNvPr id="11" name="Rectangle 10">
+            <a:extLst>
+              <a:ext uri="{FF2B5EF4-FFF2-40B4-BE49-F238E27FC236}">
+                <a16:creationId xmlns:a16="http://schemas.microsoft.com/office/drawing/2014/main" id="{81DB0393-9708-4162-8C87-722374F0E11C}"/>
+              </a:ext>
+            </a:extLst>
+          </p:cNvPr>
+          <p:cNvSpPr/>
+          <p:nvPr/>
+        </p:nvSpPr>
+        <p:spPr>
+          <a:xfrm>
+            <a:off x="4483496" y="1424865"/>
+            <a:ext cx="1030896" cy="562555"/>
+          </a:xfrm>
+          <a:prstGeom prst="rect">
+            <a:avLst/>
+          </a:prstGeom>
+          <a:noFill/>
+          <a:ln>
+            <a:solidFill>
+              <a:srgbClr val="FF0000"/>
+            </a:solidFill>
+          </a:ln>
+        </p:spPr>
+        <p:style>
+          <a:lnRef idx="2">
+            <a:schemeClr val="accent1">
+              <a:shade val="50000"/>
+            </a:schemeClr>
+          </a:lnRef>
+          <a:fillRef idx="1">
+            <a:schemeClr val="accent1"/>
+          </a:fillRef>
+          <a:effectRef idx="0">
+            <a:schemeClr val="accent1"/>
+          </a:effectRef>
+          <a:fontRef idx="minor">
+            <a:schemeClr val="lt1"/>
+          </a:fontRef>
+        </p:style>
+        <p:txBody>
+          <a:bodyPr rtlCol="0" anchor="ctr"/>
+          <a:lstStyle/>
+          <a:p>
+            <a:pPr algn="ctr"/>
+            <a:endParaRPr lang="en-DK"/>
+          </a:p>
+        </p:txBody>
+      </p:sp>
+    </p:spTree>
+    <p:extLst>
+      <p:ext uri="{BB962C8B-B14F-4D97-AF65-F5344CB8AC3E}">
+        <p14:creationId xmlns:p14="http://schemas.microsoft.com/office/powerpoint/2010/main" val="993356402"/>
+      </p:ext>
+    </p:extLst>
+  </p:cSld>
+  <p:clrMapOvr>
+    <a:masterClrMapping/>
+  </p:clrMapOvr>
+</p:sld>
+</file>
+
 <file path=ppt/slides/slide2.xml><?xml version="1.0" encoding="utf-8"?>
 <p:sld xmlns:a="http://schemas.openxmlformats.org/drawingml/2006/main" xmlns:r="http://schemas.openxmlformats.org/officeDocument/2006/relationships" xmlns:p="http://schemas.openxmlformats.org/presentationml/2006/main">
   <p:cSld>
@@ -4501,7 +4794,7 @@
           <a:p>
             <a:fld id="{22494FE4-82C8-4B3D-9413-621E3C2A6DA2}" type="datetime1">
               <a:rPr lang="en-US" smtClean="0"/>
-              <a:t>6/19/2018</a:t>
+              <a:t>6/20/2018</a:t>
             </a:fld>
             <a:endParaRPr lang="en-US"/>
           </a:p>
@@ -4927,7 +5220,7 @@
         </p:nvSpPr>
         <p:spPr>
           <a:xfrm>
-            <a:off x="914399" y="1373251"/>
+            <a:off x="914399" y="1430879"/>
             <a:ext cx="855248" cy="577048"/>
           </a:xfrm>
           <a:prstGeom prst="rect">
@@ -5023,7 +5316,7 @@
         </p:blipFill>
         <p:spPr>
           <a:xfrm>
-            <a:off x="914399" y="1063853"/>
+            <a:off x="914399" y="1077354"/>
             <a:ext cx="10241905" cy="1626815"/>
           </a:xfrm>
           <a:prstGeom prst="rect">
@@ -5183,7 +5476,7 @@
         </p:nvSpPr>
         <p:spPr>
           <a:xfrm>
-            <a:off x="1704482" y="1384917"/>
+            <a:off x="1704482" y="1429305"/>
             <a:ext cx="1447089" cy="577048"/>
           </a:xfrm>
           <a:prstGeom prst="rect">
@@ -5413,7 +5706,7 @@
         <p:spPr>
           <a:xfrm>
             <a:off x="914399" y="1078181"/>
-            <a:ext cx="10413507" cy="3693319"/>
+            <a:ext cx="10413507" cy="5078313"/>
           </a:xfrm>
           <a:prstGeom prst="rect">
             <a:avLst/>
@@ -5466,6 +5759,38 @@
               <a:rPr lang="en-US" dirty="0"/>
               <a:t> form launcher button.</a:t>
             </a:r>
+          </a:p>
+          <a:p>
+            <a:pPr marL="285750" indent="-285750" algn="just">
+              <a:buFontTx/>
+              <a:buChar char="-"/>
+            </a:pPr>
+            <a:endParaRPr lang="en-US" dirty="0"/>
+          </a:p>
+          <a:p>
+            <a:pPr marL="285750" indent="-285750" algn="just">
+              <a:buFontTx/>
+              <a:buChar char="-"/>
+            </a:pPr>
+            <a:endParaRPr lang="en-US" dirty="0"/>
+          </a:p>
+          <a:p>
+            <a:pPr marL="285750" indent="-285750" algn="just">
+              <a:buFontTx/>
+              <a:buChar char="-"/>
+            </a:pPr>
+            <a:endParaRPr lang="en-US" dirty="0"/>
+          </a:p>
+          <a:p>
+            <a:pPr marL="285750" indent="-285750" algn="just">
+              <a:buFontTx/>
+              <a:buChar char="-"/>
+            </a:pPr>
+            <a:endParaRPr lang="en-US" dirty="0"/>
+          </a:p>
+          <a:p>
+            <a:pPr algn="just"/>
+            <a:endParaRPr lang="en-US" dirty="0"/>
           </a:p>
           <a:p>
             <a:pPr marL="285750" indent="-285750" algn="just">
@@ -5603,10 +5928,980 @@
           </a:p>
         </p:txBody>
       </p:sp>
+      <p:pic>
+        <p:nvPicPr>
+          <p:cNvPr id="5" name="Picture 4">
+            <a:extLst>
+              <a:ext uri="{FF2B5EF4-FFF2-40B4-BE49-F238E27FC236}">
+                <a16:creationId xmlns:a16="http://schemas.microsoft.com/office/drawing/2014/main" id="{B64AF9CD-5A73-43D3-A4F3-D1C85E1D3317}"/>
+              </a:ext>
+            </a:extLst>
+          </p:cNvPr>
+          <p:cNvPicPr>
+            <a:picLocks noChangeAspect="1"/>
+          </p:cNvPicPr>
+          <p:nvPr/>
+        </p:nvPicPr>
+        <p:blipFill>
+          <a:blip r:embed="rId3">
+            <a:extLst>
+              <a:ext uri="{28A0092B-C50C-407E-A947-70E740481C1C}">
+                <a14:useLocalDpi xmlns:a14="http://schemas.microsoft.com/office/drawing/2010/main" val="0"/>
+              </a:ext>
+            </a:extLst>
+          </a:blip>
+          <a:stretch>
+            <a:fillRect/>
+          </a:stretch>
+        </p:blipFill>
+        <p:spPr>
+          <a:xfrm>
+            <a:off x="4721652" y="3063340"/>
+            <a:ext cx="2443895" cy="1789089"/>
+          </a:xfrm>
+          <a:prstGeom prst="rect">
+            <a:avLst/>
+          </a:prstGeom>
+        </p:spPr>
+      </p:pic>
     </p:spTree>
     <p:extLst>
       <p:ext uri="{BB962C8B-B14F-4D97-AF65-F5344CB8AC3E}">
         <p14:creationId xmlns:p14="http://schemas.microsoft.com/office/powerpoint/2010/main" val="1135852911"/>
+      </p:ext>
+    </p:extLst>
+  </p:cSld>
+  <p:clrMapOvr>
+    <a:masterClrMapping/>
+  </p:clrMapOvr>
+</p:sld>
+</file>
+
+<file path=ppt/slides/slide7.xml><?xml version="1.0" encoding="utf-8"?>
+<p:sld xmlns:a="http://schemas.openxmlformats.org/drawingml/2006/main" xmlns:r="http://schemas.openxmlformats.org/officeDocument/2006/relationships" xmlns:p="http://schemas.openxmlformats.org/presentationml/2006/main">
+  <p:cSld>
+    <p:spTree>
+      <p:nvGrpSpPr>
+        <p:cNvPr id="1" name=""/>
+        <p:cNvGrpSpPr/>
+        <p:nvPr/>
+      </p:nvGrpSpPr>
+      <p:grpSpPr>
+        <a:xfrm>
+          <a:off x="0" y="0"/>
+          <a:ext cx="0" cy="0"/>
+          <a:chOff x="0" y="0"/>
+          <a:chExt cx="0" cy="0"/>
+        </a:xfrm>
+      </p:grpSpPr>
+      <p:sp>
+        <p:nvSpPr>
+          <p:cNvPr id="10" name="Title 9">
+            <a:extLst>
+              <a:ext uri="{FF2B5EF4-FFF2-40B4-BE49-F238E27FC236}">
+                <a16:creationId xmlns:a16="http://schemas.microsoft.com/office/drawing/2014/main" id="{075C7462-EC0F-4D68-9952-92573D54C26C}"/>
+              </a:ext>
+            </a:extLst>
+          </p:cNvPr>
+          <p:cNvSpPr>
+            <a:spLocks noGrp="1"/>
+          </p:cNvSpPr>
+          <p:nvPr>
+            <p:ph type="title"/>
+          </p:nvPr>
+        </p:nvSpPr>
+        <p:spPr>
+          <a:xfrm>
+            <a:off x="914400" y="346230"/>
+            <a:ext cx="10058400" cy="559292"/>
+          </a:xfrm>
+        </p:spPr>
+        <p:txBody>
+          <a:bodyPr>
+            <a:normAutofit fontScale="90000"/>
+          </a:bodyPr>
+          <a:lstStyle/>
+          <a:p>
+            <a:r>
+              <a:rPr lang="en-US" b="1" dirty="0"/>
+              <a:t>File Parser Section/Page</a:t>
+            </a:r>
+            <a:endParaRPr lang="en-DK" dirty="0"/>
+          </a:p>
+        </p:txBody>
+      </p:sp>
+      <p:sp>
+        <p:nvSpPr>
+          <p:cNvPr id="9" name="Footer Placeholder 8">
+            <a:extLst>
+              <a:ext uri="{FF2B5EF4-FFF2-40B4-BE49-F238E27FC236}">
+                <a16:creationId xmlns:a16="http://schemas.microsoft.com/office/drawing/2014/main" id="{60D1BBA5-12BC-45B2-9AB4-96ED4FFC6E4D}"/>
+              </a:ext>
+            </a:extLst>
+          </p:cNvPr>
+          <p:cNvSpPr>
+            <a:spLocks noGrp="1"/>
+          </p:cNvSpPr>
+          <p:nvPr>
+            <p:ph type="ftr" sz="quarter" idx="11"/>
+          </p:nvPr>
+        </p:nvSpPr>
+        <p:spPr>
+          <a:xfrm>
+            <a:off x="10948725" y="6422313"/>
+            <a:ext cx="962549" cy="404614"/>
+          </a:xfrm>
+        </p:spPr>
+        <p:txBody>
+          <a:bodyPr/>
+          <a:lstStyle/>
+          <a:p>
+            <a:r>
+              <a:rPr lang="en-US" dirty="0"/>
+              <a:t>@</a:t>
+            </a:r>
+            <a:r>
+              <a:rPr lang="en-US" dirty="0" err="1"/>
+              <a:t>DexTools</a:t>
+            </a:r>
+            <a:endParaRPr lang="en-US" dirty="0"/>
+          </a:p>
+        </p:txBody>
+      </p:sp>
+      <p:sp>
+        <p:nvSpPr>
+          <p:cNvPr id="2" name="Rectangle 1">
+            <a:extLst>
+              <a:ext uri="{FF2B5EF4-FFF2-40B4-BE49-F238E27FC236}">
+                <a16:creationId xmlns:a16="http://schemas.microsoft.com/office/drawing/2014/main" id="{8FF41D02-881F-48A5-B4AD-941998DAF8A2}"/>
+              </a:ext>
+            </a:extLst>
+          </p:cNvPr>
+          <p:cNvSpPr/>
+          <p:nvPr/>
+        </p:nvSpPr>
+        <p:spPr>
+          <a:xfrm>
+            <a:off x="914399" y="1078181"/>
+            <a:ext cx="10413507" cy="4247317"/>
+          </a:xfrm>
+          <a:prstGeom prst="rect">
+            <a:avLst/>
+          </a:prstGeom>
+        </p:spPr>
+        <p:txBody>
+          <a:bodyPr wrap="square">
+            <a:spAutoFit/>
+          </a:bodyPr>
+          <a:lstStyle/>
+          <a:p>
+            <a:endParaRPr lang="en-US" dirty="0"/>
+          </a:p>
+          <a:p>
+            <a:endParaRPr lang="en-US" dirty="0"/>
+          </a:p>
+          <a:p>
+            <a:endParaRPr lang="en-US" dirty="0"/>
+          </a:p>
+          <a:p>
+            <a:endParaRPr lang="en-US" dirty="0"/>
+          </a:p>
+          <a:p>
+            <a:endParaRPr lang="en-US" dirty="0"/>
+          </a:p>
+          <a:p>
+            <a:endParaRPr lang="en-US" dirty="0"/>
+          </a:p>
+          <a:p>
+            <a:endParaRPr lang="en-US" dirty="0"/>
+          </a:p>
+          <a:p>
+            <a:endParaRPr lang="en-US" dirty="0"/>
+          </a:p>
+          <a:p>
+            <a:endParaRPr lang="en-US" dirty="0"/>
+          </a:p>
+          <a:p>
+            <a:r>
+              <a:rPr lang="en-US" dirty="0"/>
+              <a:t>Contains the Ribbon Section and Functions for handling files scanning at selected locations. It contains some regex and bounds for the return lists. It can scan for all metadata (</a:t>
+            </a:r>
+            <a:r>
+              <a:rPr lang="en-US" dirty="0" err="1"/>
+              <a:t>exif</a:t>
+            </a:r>
+            <a:r>
+              <a:rPr lang="en-US" dirty="0"/>
+              <a:t>) info of files.</a:t>
+            </a:r>
+          </a:p>
+          <a:p>
+            <a:r>
+              <a:rPr lang="en-US" dirty="0"/>
+              <a:t>Some planned improvements: </a:t>
+            </a:r>
+          </a:p>
+          <a:p>
+            <a:r>
+              <a:rPr lang="en-US" dirty="0"/>
+              <a:t>- add metadata matching</a:t>
+            </a:r>
+          </a:p>
+          <a:p>
+            <a:r>
+              <a:rPr lang="en-US" dirty="0"/>
+              <a:t>- allow for copy/moving files to specified folders</a:t>
+            </a:r>
+          </a:p>
+          <a:p>
+            <a:r>
+              <a:rPr lang="en-US" dirty="0"/>
+              <a:t>- add in-file content matching</a:t>
+            </a:r>
+          </a:p>
+        </p:txBody>
+      </p:sp>
+      <p:sp>
+        <p:nvSpPr>
+          <p:cNvPr id="4" name="Rectangle 3">
+            <a:extLst>
+              <a:ext uri="{FF2B5EF4-FFF2-40B4-BE49-F238E27FC236}">
+                <a16:creationId xmlns:a16="http://schemas.microsoft.com/office/drawing/2014/main" id="{46584488-A7B0-4804-8E93-ECDBB1E6AF8C}"/>
+              </a:ext>
+            </a:extLst>
+          </p:cNvPr>
+          <p:cNvSpPr/>
+          <p:nvPr/>
+        </p:nvSpPr>
+        <p:spPr>
+          <a:xfrm>
+            <a:off x="3116034" y="1442404"/>
+            <a:ext cx="1420456" cy="577048"/>
+          </a:xfrm>
+          <a:prstGeom prst="rect">
+            <a:avLst/>
+          </a:prstGeom>
+          <a:noFill/>
+          <a:ln>
+            <a:solidFill>
+              <a:srgbClr val="FF0000"/>
+            </a:solidFill>
+          </a:ln>
+        </p:spPr>
+        <p:style>
+          <a:lnRef idx="2">
+            <a:schemeClr val="accent1">
+              <a:shade val="50000"/>
+            </a:schemeClr>
+          </a:lnRef>
+          <a:fillRef idx="1">
+            <a:schemeClr val="accent1"/>
+          </a:fillRef>
+          <a:effectRef idx="0">
+            <a:schemeClr val="accent1"/>
+          </a:effectRef>
+          <a:fontRef idx="minor">
+            <a:schemeClr val="lt1"/>
+          </a:fontRef>
+        </p:style>
+        <p:txBody>
+          <a:bodyPr rtlCol="0" anchor="ctr"/>
+          <a:lstStyle/>
+          <a:p>
+            <a:pPr algn="ctr"/>
+            <a:endParaRPr lang="en-DK"/>
+          </a:p>
+        </p:txBody>
+      </p:sp>
+      <p:pic>
+        <p:nvPicPr>
+          <p:cNvPr id="5" name="Picture 4">
+            <a:extLst>
+              <a:ext uri="{FF2B5EF4-FFF2-40B4-BE49-F238E27FC236}">
+                <a16:creationId xmlns:a16="http://schemas.microsoft.com/office/drawing/2014/main" id="{E4AC70B2-2CC3-47C2-AF41-E1B35D8F6AEB}"/>
+              </a:ext>
+            </a:extLst>
+          </p:cNvPr>
+          <p:cNvPicPr>
+            <a:picLocks noChangeAspect="1"/>
+          </p:cNvPicPr>
+          <p:nvPr/>
+        </p:nvPicPr>
+        <p:blipFill>
+          <a:blip r:embed="rId2">
+            <a:extLst>
+              <a:ext uri="{28A0092B-C50C-407E-A947-70E740481C1C}">
+                <a14:useLocalDpi xmlns:a14="http://schemas.microsoft.com/office/drawing/2010/main" val="0"/>
+              </a:ext>
+            </a:extLst>
+          </a:blip>
+          <a:stretch>
+            <a:fillRect/>
+          </a:stretch>
+        </p:blipFill>
+        <p:spPr>
+          <a:xfrm>
+            <a:off x="914398" y="1078180"/>
+            <a:ext cx="10058401" cy="2185697"/>
+          </a:xfrm>
+          <a:prstGeom prst="rect">
+            <a:avLst/>
+          </a:prstGeom>
+        </p:spPr>
+      </p:pic>
+      <p:sp>
+        <p:nvSpPr>
+          <p:cNvPr id="11" name="Rectangle 10">
+            <a:extLst>
+              <a:ext uri="{FF2B5EF4-FFF2-40B4-BE49-F238E27FC236}">
+                <a16:creationId xmlns:a16="http://schemas.microsoft.com/office/drawing/2014/main" id="{81DB0393-9708-4162-8C87-722374F0E11C}"/>
+              </a:ext>
+            </a:extLst>
+          </p:cNvPr>
+          <p:cNvSpPr/>
+          <p:nvPr/>
+        </p:nvSpPr>
+        <p:spPr>
+          <a:xfrm>
+            <a:off x="4388108" y="1371600"/>
+            <a:ext cx="3356300" cy="647852"/>
+          </a:xfrm>
+          <a:prstGeom prst="rect">
+            <a:avLst/>
+          </a:prstGeom>
+          <a:noFill/>
+          <a:ln>
+            <a:solidFill>
+              <a:srgbClr val="FF0000"/>
+            </a:solidFill>
+          </a:ln>
+        </p:spPr>
+        <p:style>
+          <a:lnRef idx="2">
+            <a:schemeClr val="accent1">
+              <a:shade val="50000"/>
+            </a:schemeClr>
+          </a:lnRef>
+          <a:fillRef idx="1">
+            <a:schemeClr val="accent1"/>
+          </a:fillRef>
+          <a:effectRef idx="0">
+            <a:schemeClr val="accent1"/>
+          </a:effectRef>
+          <a:fontRef idx="minor">
+            <a:schemeClr val="lt1"/>
+          </a:fontRef>
+        </p:style>
+        <p:txBody>
+          <a:bodyPr rtlCol="0" anchor="ctr"/>
+          <a:lstStyle/>
+          <a:p>
+            <a:pPr algn="ctr"/>
+            <a:endParaRPr lang="en-DK"/>
+          </a:p>
+        </p:txBody>
+      </p:sp>
+    </p:spTree>
+    <p:extLst>
+      <p:ext uri="{BB962C8B-B14F-4D97-AF65-F5344CB8AC3E}">
+        <p14:creationId xmlns:p14="http://schemas.microsoft.com/office/powerpoint/2010/main" val="1660503907"/>
+      </p:ext>
+    </p:extLst>
+  </p:cSld>
+  <p:clrMapOvr>
+    <a:masterClrMapping/>
+  </p:clrMapOvr>
+</p:sld>
+</file>
+
+<file path=ppt/slides/slide8.xml><?xml version="1.0" encoding="utf-8"?>
+<p:sld xmlns:a="http://schemas.openxmlformats.org/drawingml/2006/main" xmlns:r="http://schemas.openxmlformats.org/officeDocument/2006/relationships" xmlns:p="http://schemas.openxmlformats.org/presentationml/2006/main">
+  <p:cSld>
+    <p:spTree>
+      <p:nvGrpSpPr>
+        <p:cNvPr id="1" name=""/>
+        <p:cNvGrpSpPr/>
+        <p:nvPr/>
+      </p:nvGrpSpPr>
+      <p:grpSpPr>
+        <a:xfrm>
+          <a:off x="0" y="0"/>
+          <a:ext cx="0" cy="0"/>
+          <a:chOff x="0" y="0"/>
+          <a:chExt cx="0" cy="0"/>
+        </a:xfrm>
+      </p:grpSpPr>
+      <p:sp>
+        <p:nvSpPr>
+          <p:cNvPr id="10" name="Title 9">
+            <a:extLst>
+              <a:ext uri="{FF2B5EF4-FFF2-40B4-BE49-F238E27FC236}">
+                <a16:creationId xmlns:a16="http://schemas.microsoft.com/office/drawing/2014/main" id="{075C7462-EC0F-4D68-9952-92573D54C26C}"/>
+              </a:ext>
+            </a:extLst>
+          </p:cNvPr>
+          <p:cNvSpPr>
+            <a:spLocks noGrp="1"/>
+          </p:cNvSpPr>
+          <p:nvPr>
+            <p:ph type="title"/>
+          </p:nvPr>
+        </p:nvSpPr>
+        <p:spPr>
+          <a:xfrm>
+            <a:off x="914400" y="346230"/>
+            <a:ext cx="10058400" cy="559292"/>
+          </a:xfrm>
+        </p:spPr>
+        <p:txBody>
+          <a:bodyPr>
+            <a:normAutofit fontScale="90000"/>
+          </a:bodyPr>
+          <a:lstStyle/>
+          <a:p>
+            <a:r>
+              <a:rPr lang="en-US" b="1" dirty="0"/>
+              <a:t>Ribbon Editor Sections/Page</a:t>
+            </a:r>
+            <a:endParaRPr lang="en-DK" dirty="0"/>
+          </a:p>
+        </p:txBody>
+      </p:sp>
+      <p:sp>
+        <p:nvSpPr>
+          <p:cNvPr id="9" name="Footer Placeholder 8">
+            <a:extLst>
+              <a:ext uri="{FF2B5EF4-FFF2-40B4-BE49-F238E27FC236}">
+                <a16:creationId xmlns:a16="http://schemas.microsoft.com/office/drawing/2014/main" id="{60D1BBA5-12BC-45B2-9AB4-96ED4FFC6E4D}"/>
+              </a:ext>
+            </a:extLst>
+          </p:cNvPr>
+          <p:cNvSpPr>
+            <a:spLocks noGrp="1"/>
+          </p:cNvSpPr>
+          <p:nvPr>
+            <p:ph type="ftr" sz="quarter" idx="11"/>
+          </p:nvPr>
+        </p:nvSpPr>
+        <p:spPr>
+          <a:xfrm>
+            <a:off x="10948725" y="6422313"/>
+            <a:ext cx="962549" cy="404614"/>
+          </a:xfrm>
+        </p:spPr>
+        <p:txBody>
+          <a:bodyPr/>
+          <a:lstStyle/>
+          <a:p>
+            <a:r>
+              <a:rPr lang="en-US" dirty="0"/>
+              <a:t>@</a:t>
+            </a:r>
+            <a:r>
+              <a:rPr lang="en-US" dirty="0" err="1"/>
+              <a:t>DexTools</a:t>
+            </a:r>
+            <a:endParaRPr lang="en-US" dirty="0"/>
+          </a:p>
+        </p:txBody>
+      </p:sp>
+      <p:sp>
+        <p:nvSpPr>
+          <p:cNvPr id="2" name="Rectangle 1">
+            <a:extLst>
+              <a:ext uri="{FF2B5EF4-FFF2-40B4-BE49-F238E27FC236}">
+                <a16:creationId xmlns:a16="http://schemas.microsoft.com/office/drawing/2014/main" id="{8FF41D02-881F-48A5-B4AD-941998DAF8A2}"/>
+              </a:ext>
+            </a:extLst>
+          </p:cNvPr>
+          <p:cNvSpPr/>
+          <p:nvPr/>
+        </p:nvSpPr>
+        <p:spPr>
+          <a:xfrm>
+            <a:off x="914399" y="1078181"/>
+            <a:ext cx="10413507" cy="4801314"/>
+          </a:xfrm>
+          <a:prstGeom prst="rect">
+            <a:avLst/>
+          </a:prstGeom>
+        </p:spPr>
+        <p:txBody>
+          <a:bodyPr wrap="square">
+            <a:spAutoFit/>
+          </a:bodyPr>
+          <a:lstStyle/>
+          <a:p>
+            <a:endParaRPr lang="en-US" dirty="0"/>
+          </a:p>
+          <a:p>
+            <a:endParaRPr lang="en-US" dirty="0"/>
+          </a:p>
+          <a:p>
+            <a:endParaRPr lang="en-US" dirty="0"/>
+          </a:p>
+          <a:p>
+            <a:endParaRPr lang="en-US" dirty="0"/>
+          </a:p>
+          <a:p>
+            <a:endParaRPr lang="en-US" dirty="0"/>
+          </a:p>
+          <a:p>
+            <a:endParaRPr lang="en-US" dirty="0"/>
+          </a:p>
+          <a:p>
+            <a:endParaRPr lang="en-US" dirty="0"/>
+          </a:p>
+          <a:p>
+            <a:endParaRPr lang="en-US" dirty="0"/>
+          </a:p>
+          <a:p>
+            <a:endParaRPr lang="en-US" dirty="0"/>
+          </a:p>
+          <a:p>
+            <a:pPr algn="just"/>
+            <a:r>
+              <a:rPr lang="en-US" dirty="0"/>
+              <a:t>Contains the Ribbon Section and Functions for editing the Ribbon interface. It can read a macro enabled file (Excel and Word for now) and decompose it. It then reads the Ribbon xml content and insert move, delete components. In the end it can recompose the file with the new ribbon and save is as </a:t>
+            </a:r>
+            <a:r>
+              <a:rPr lang="en-US" dirty="0" err="1"/>
+              <a:t>Name_new</a:t>
+            </a:r>
+            <a:r>
+              <a:rPr lang="en-US" dirty="0"/>
+              <a:t> in the same folder.</a:t>
+            </a:r>
+          </a:p>
+          <a:p>
+            <a:endParaRPr lang="en-US" dirty="0"/>
+          </a:p>
+          <a:p>
+            <a:r>
+              <a:rPr lang="en-US" dirty="0"/>
+              <a:t>Some planned improvements: </a:t>
+            </a:r>
+          </a:p>
+          <a:p>
+            <a:r>
+              <a:rPr lang="en-US" dirty="0"/>
+              <a:t>- scan and decompose Access files</a:t>
+            </a:r>
+          </a:p>
+          <a:p>
+            <a:r>
+              <a:rPr lang="en-US" dirty="0"/>
+              <a:t>- implement more tests for the ribbon interface to make it more stabile</a:t>
+            </a:r>
+          </a:p>
+        </p:txBody>
+      </p:sp>
+      <p:pic>
+        <p:nvPicPr>
+          <p:cNvPr id="7" name="Picture 6">
+            <a:extLst>
+              <a:ext uri="{FF2B5EF4-FFF2-40B4-BE49-F238E27FC236}">
+                <a16:creationId xmlns:a16="http://schemas.microsoft.com/office/drawing/2014/main" id="{3E6CFDDA-BABA-4AAA-A511-1153C2DB4B47}"/>
+              </a:ext>
+            </a:extLst>
+          </p:cNvPr>
+          <p:cNvPicPr>
+            <a:picLocks noChangeAspect="1"/>
+          </p:cNvPicPr>
+          <p:nvPr/>
+        </p:nvPicPr>
+        <p:blipFill>
+          <a:blip r:embed="rId2"/>
+          <a:stretch>
+            <a:fillRect/>
+          </a:stretch>
+        </p:blipFill>
+        <p:spPr>
+          <a:xfrm>
+            <a:off x="914399" y="1071132"/>
+            <a:ext cx="10363201" cy="2250941"/>
+          </a:xfrm>
+          <a:prstGeom prst="rect">
+            <a:avLst/>
+          </a:prstGeom>
+        </p:spPr>
+      </p:pic>
+      <p:sp>
+        <p:nvSpPr>
+          <p:cNvPr id="11" name="Rectangle 10">
+            <a:extLst>
+              <a:ext uri="{FF2B5EF4-FFF2-40B4-BE49-F238E27FC236}">
+                <a16:creationId xmlns:a16="http://schemas.microsoft.com/office/drawing/2014/main" id="{81DB0393-9708-4162-8C87-722374F0E11C}"/>
+              </a:ext>
+            </a:extLst>
+          </p:cNvPr>
+          <p:cNvSpPr/>
+          <p:nvPr/>
+        </p:nvSpPr>
+        <p:spPr>
+          <a:xfrm>
+            <a:off x="4394718" y="1371599"/>
+            <a:ext cx="6554006" cy="1017037"/>
+          </a:xfrm>
+          <a:prstGeom prst="rect">
+            <a:avLst/>
+          </a:prstGeom>
+          <a:noFill/>
+          <a:ln>
+            <a:solidFill>
+              <a:srgbClr val="FF0000"/>
+            </a:solidFill>
+          </a:ln>
+        </p:spPr>
+        <p:style>
+          <a:lnRef idx="2">
+            <a:schemeClr val="accent1">
+              <a:shade val="50000"/>
+            </a:schemeClr>
+          </a:lnRef>
+          <a:fillRef idx="1">
+            <a:schemeClr val="accent1"/>
+          </a:fillRef>
+          <a:effectRef idx="0">
+            <a:schemeClr val="accent1"/>
+          </a:effectRef>
+          <a:fontRef idx="minor">
+            <a:schemeClr val="lt1"/>
+          </a:fontRef>
+        </p:style>
+        <p:txBody>
+          <a:bodyPr rtlCol="0" anchor="ctr"/>
+          <a:lstStyle/>
+          <a:p>
+            <a:pPr algn="ctr"/>
+            <a:endParaRPr lang="en-DK"/>
+          </a:p>
+        </p:txBody>
+      </p:sp>
+    </p:spTree>
+    <p:extLst>
+      <p:ext uri="{BB962C8B-B14F-4D97-AF65-F5344CB8AC3E}">
+        <p14:creationId xmlns:p14="http://schemas.microsoft.com/office/powerpoint/2010/main" val="4199862088"/>
+      </p:ext>
+    </p:extLst>
+  </p:cSld>
+  <p:clrMapOvr>
+    <a:masterClrMapping/>
+  </p:clrMapOvr>
+</p:sld>
+</file>
+
+<file path=ppt/slides/slide9.xml><?xml version="1.0" encoding="utf-8"?>
+<p:sld xmlns:a="http://schemas.openxmlformats.org/drawingml/2006/main" xmlns:r="http://schemas.openxmlformats.org/officeDocument/2006/relationships" xmlns:p="http://schemas.openxmlformats.org/presentationml/2006/main">
+  <p:cSld>
+    <p:spTree>
+      <p:nvGrpSpPr>
+        <p:cNvPr id="1" name=""/>
+        <p:cNvGrpSpPr/>
+        <p:nvPr/>
+      </p:nvGrpSpPr>
+      <p:grpSpPr>
+        <a:xfrm>
+          <a:off x="0" y="0"/>
+          <a:ext cx="0" cy="0"/>
+          <a:chOff x="0" y="0"/>
+          <a:chExt cx="0" cy="0"/>
+        </a:xfrm>
+      </p:grpSpPr>
+      <p:pic>
+        <p:nvPicPr>
+          <p:cNvPr id="12" name="Picture 11">
+            <a:extLst>
+              <a:ext uri="{FF2B5EF4-FFF2-40B4-BE49-F238E27FC236}">
+                <a16:creationId xmlns:a16="http://schemas.microsoft.com/office/drawing/2014/main" id="{283B57F2-7F08-4AF6-922B-FDA3E1B35F33}"/>
+              </a:ext>
+            </a:extLst>
+          </p:cNvPr>
+          <p:cNvPicPr>
+            <a:picLocks noChangeAspect="1"/>
+          </p:cNvPicPr>
+          <p:nvPr/>
+        </p:nvPicPr>
+        <p:blipFill>
+          <a:blip r:embed="rId2">
+            <a:extLst>
+              <a:ext uri="{28A0092B-C50C-407E-A947-70E740481C1C}">
+                <a14:useLocalDpi xmlns:a14="http://schemas.microsoft.com/office/drawing/2010/main" val="0"/>
+              </a:ext>
+            </a:extLst>
+          </a:blip>
+          <a:stretch>
+            <a:fillRect/>
+          </a:stretch>
+        </p:blipFill>
+        <p:spPr>
+          <a:xfrm>
+            <a:off x="914399" y="1078181"/>
+            <a:ext cx="10363201" cy="2324001"/>
+          </a:xfrm>
+          <a:prstGeom prst="rect">
+            <a:avLst/>
+          </a:prstGeom>
+        </p:spPr>
+      </p:pic>
+      <p:sp>
+        <p:nvSpPr>
+          <p:cNvPr id="10" name="Title 9">
+            <a:extLst>
+              <a:ext uri="{FF2B5EF4-FFF2-40B4-BE49-F238E27FC236}">
+                <a16:creationId xmlns:a16="http://schemas.microsoft.com/office/drawing/2014/main" id="{075C7462-EC0F-4D68-9952-92573D54C26C}"/>
+              </a:ext>
+            </a:extLst>
+          </p:cNvPr>
+          <p:cNvSpPr>
+            <a:spLocks noGrp="1"/>
+          </p:cNvSpPr>
+          <p:nvPr>
+            <p:ph type="title"/>
+          </p:nvPr>
+        </p:nvSpPr>
+        <p:spPr>
+          <a:xfrm>
+            <a:off x="914400" y="346230"/>
+            <a:ext cx="10058400" cy="559292"/>
+          </a:xfrm>
+        </p:spPr>
+        <p:txBody>
+          <a:bodyPr>
+            <a:normAutofit fontScale="90000"/>
+          </a:bodyPr>
+          <a:lstStyle/>
+          <a:p>
+            <a:r>
+              <a:rPr lang="en-US" b="1" dirty="0"/>
+              <a:t>Test Runner Sections/Page</a:t>
+            </a:r>
+            <a:endParaRPr lang="en-DK" dirty="0"/>
+          </a:p>
+        </p:txBody>
+      </p:sp>
+      <p:sp>
+        <p:nvSpPr>
+          <p:cNvPr id="9" name="Footer Placeholder 8">
+            <a:extLst>
+              <a:ext uri="{FF2B5EF4-FFF2-40B4-BE49-F238E27FC236}">
+                <a16:creationId xmlns:a16="http://schemas.microsoft.com/office/drawing/2014/main" id="{60D1BBA5-12BC-45B2-9AB4-96ED4FFC6E4D}"/>
+              </a:ext>
+            </a:extLst>
+          </p:cNvPr>
+          <p:cNvSpPr>
+            <a:spLocks noGrp="1"/>
+          </p:cNvSpPr>
+          <p:nvPr>
+            <p:ph type="ftr" sz="quarter" idx="11"/>
+          </p:nvPr>
+        </p:nvSpPr>
+        <p:spPr>
+          <a:xfrm>
+            <a:off x="10948725" y="6422313"/>
+            <a:ext cx="962549" cy="404614"/>
+          </a:xfrm>
+        </p:spPr>
+        <p:txBody>
+          <a:bodyPr/>
+          <a:lstStyle/>
+          <a:p>
+            <a:r>
+              <a:rPr lang="en-US" dirty="0"/>
+              <a:t>@</a:t>
+            </a:r>
+            <a:r>
+              <a:rPr lang="en-US" dirty="0" err="1"/>
+              <a:t>DexTools</a:t>
+            </a:r>
+            <a:endParaRPr lang="en-US" dirty="0"/>
+          </a:p>
+        </p:txBody>
+      </p:sp>
+      <p:sp>
+        <p:nvSpPr>
+          <p:cNvPr id="2" name="Rectangle 1">
+            <a:extLst>
+              <a:ext uri="{FF2B5EF4-FFF2-40B4-BE49-F238E27FC236}">
+                <a16:creationId xmlns:a16="http://schemas.microsoft.com/office/drawing/2014/main" id="{8FF41D02-881F-48A5-B4AD-941998DAF8A2}"/>
+              </a:ext>
+            </a:extLst>
+          </p:cNvPr>
+          <p:cNvSpPr/>
+          <p:nvPr/>
+        </p:nvSpPr>
+        <p:spPr>
+          <a:xfrm>
+            <a:off x="914399" y="1078181"/>
+            <a:ext cx="10413507" cy="5078313"/>
+          </a:xfrm>
+          <a:prstGeom prst="rect">
+            <a:avLst/>
+          </a:prstGeom>
+        </p:spPr>
+        <p:txBody>
+          <a:bodyPr wrap="square">
+            <a:spAutoFit/>
+          </a:bodyPr>
+          <a:lstStyle/>
+          <a:p>
+            <a:endParaRPr lang="en-US" dirty="0"/>
+          </a:p>
+          <a:p>
+            <a:endParaRPr lang="en-US" dirty="0"/>
+          </a:p>
+          <a:p>
+            <a:endParaRPr lang="en-US" dirty="0"/>
+          </a:p>
+          <a:p>
+            <a:endParaRPr lang="en-US" dirty="0"/>
+          </a:p>
+          <a:p>
+            <a:endParaRPr lang="en-US" dirty="0"/>
+          </a:p>
+          <a:p>
+            <a:endParaRPr lang="en-US" dirty="0"/>
+          </a:p>
+          <a:p>
+            <a:endParaRPr lang="en-US" dirty="0"/>
+          </a:p>
+          <a:p>
+            <a:endParaRPr lang="en-US" dirty="0"/>
+          </a:p>
+          <a:p>
+            <a:endParaRPr lang="en-US" dirty="0"/>
+          </a:p>
+          <a:p>
+            <a:r>
+              <a:rPr lang="en-US" dirty="0"/>
+              <a:t>Contains all functions to autogenerate, import/export, enable/disable/delete, run and evaluate history of tests.</a:t>
+            </a:r>
+          </a:p>
+          <a:p>
+            <a:endParaRPr lang="en-US" dirty="0"/>
+          </a:p>
+          <a:p>
+            <a:r>
+              <a:rPr lang="en-US" dirty="0"/>
+              <a:t>Some planned improvements: </a:t>
+            </a:r>
+          </a:p>
+          <a:p>
+            <a:pPr marL="285750" indent="-285750">
+              <a:buFontTx/>
+              <a:buChar char="-"/>
+            </a:pPr>
+            <a:r>
+              <a:rPr lang="en-US" dirty="0"/>
+              <a:t>add much more tests</a:t>
+            </a:r>
+          </a:p>
+          <a:p>
+            <a:pPr marL="285750" indent="-285750">
+              <a:buFontTx/>
+              <a:buChar char="-"/>
+            </a:pPr>
+            <a:r>
+              <a:rPr lang="en-US" dirty="0"/>
+              <a:t>fix the unit tests ode and add stage update/creation for test</a:t>
+            </a:r>
+          </a:p>
+          <a:p>
+            <a:pPr marL="285750" indent="-285750">
+              <a:buFontTx/>
+              <a:buChar char="-"/>
+            </a:pPr>
+            <a:r>
+              <a:rPr lang="en-US" dirty="0"/>
+              <a:t>fix the </a:t>
+            </a:r>
+            <a:r>
+              <a:rPr lang="en-US" dirty="0" err="1"/>
+              <a:t>javascript</a:t>
+            </a:r>
+            <a:r>
+              <a:rPr lang="en-US" dirty="0"/>
+              <a:t> testing extension</a:t>
+            </a:r>
+          </a:p>
+          <a:p>
+            <a:pPr marL="285750" indent="-285750">
+              <a:buFontTx/>
+              <a:buChar char="-"/>
+            </a:pPr>
+            <a:r>
+              <a:rPr lang="en-US" dirty="0"/>
+              <a:t>add php testing</a:t>
+            </a:r>
+          </a:p>
+          <a:p>
+            <a:pPr marL="285750" indent="-285750">
+              <a:buFontTx/>
+              <a:buChar char="-"/>
+            </a:pPr>
+            <a:r>
+              <a:rPr lang="en-US" dirty="0"/>
+              <a:t>implement more tests for the ribbon interface functionality to make it more stabile</a:t>
+            </a:r>
+          </a:p>
+        </p:txBody>
+      </p:sp>
+      <p:sp>
+        <p:nvSpPr>
+          <p:cNvPr id="11" name="Rectangle 10">
+            <a:extLst>
+              <a:ext uri="{FF2B5EF4-FFF2-40B4-BE49-F238E27FC236}">
+                <a16:creationId xmlns:a16="http://schemas.microsoft.com/office/drawing/2014/main" id="{81DB0393-9708-4162-8C87-722374F0E11C}"/>
+              </a:ext>
+            </a:extLst>
+          </p:cNvPr>
+          <p:cNvSpPr/>
+          <p:nvPr/>
+        </p:nvSpPr>
+        <p:spPr>
+          <a:xfrm>
+            <a:off x="4483496" y="1424865"/>
+            <a:ext cx="3391542" cy="572611"/>
+          </a:xfrm>
+          <a:prstGeom prst="rect">
+            <a:avLst/>
+          </a:prstGeom>
+          <a:noFill/>
+          <a:ln>
+            <a:solidFill>
+              <a:srgbClr val="FF0000"/>
+            </a:solidFill>
+          </a:ln>
+        </p:spPr>
+        <p:style>
+          <a:lnRef idx="2">
+            <a:schemeClr val="accent1">
+              <a:shade val="50000"/>
+            </a:schemeClr>
+          </a:lnRef>
+          <a:fillRef idx="1">
+            <a:schemeClr val="accent1"/>
+          </a:fillRef>
+          <a:effectRef idx="0">
+            <a:schemeClr val="accent1"/>
+          </a:effectRef>
+          <a:fontRef idx="minor">
+            <a:schemeClr val="lt1"/>
+          </a:fontRef>
+        </p:style>
+        <p:txBody>
+          <a:bodyPr rtlCol="0" anchor="ctr"/>
+          <a:lstStyle/>
+          <a:p>
+            <a:pPr algn="ctr"/>
+            <a:endParaRPr lang="en-DK"/>
+          </a:p>
+        </p:txBody>
+      </p:sp>
+    </p:spTree>
+    <p:extLst>
+      <p:ext uri="{BB962C8B-B14F-4D97-AF65-F5344CB8AC3E}">
+        <p14:creationId xmlns:p14="http://schemas.microsoft.com/office/powerpoint/2010/main" val="2656802445"/>
       </p:ext>
     </p:extLst>
   </p:cSld>

</xml_diff>